<commit_message>
Added Elixir usage to presentation
</commit_message>
<xml_diff>
--- a/Elixir Tech Talk.pptx
+++ b/Elixir Tech Talk.pptx
@@ -737,7 +737,7 @@
           </a:ln>
           <a:extLst>
             <a:ext uri="{C572A759-6A51-4108-AA02-DFA0A04FC94B}">
-              <ma14:wrappingTextBoxFlag xmlns="" xmlns:m="http://schemas.openxmlformats.org/officeDocument/2006/math" xmlns:a14="http://schemas.microsoft.com/office/drawing/2010/main" xmlns:ma14="http://schemas.microsoft.com/office/mac/drawingml/2011/main" val="1"/>
+              <ma14:wrappingTextBoxFlag xmlns:ma14="http://schemas.microsoft.com/office/mac/drawingml/2011/main" xmlns:a14="http://schemas.microsoft.com/office/drawing/2010/main" xmlns:m="http://schemas.openxmlformats.org/officeDocument/2006/math" xmlns="" val="1"/>
             </a:ext>
           </a:extLst>
         </p:spPr>
@@ -1005,7 +1005,7 @@
           </a:ln>
           <a:extLst>
             <a:ext uri="{C572A759-6A51-4108-AA02-DFA0A04FC94B}">
-              <ma14:wrappingTextBoxFlag xmlns="" xmlns:m="http://schemas.openxmlformats.org/officeDocument/2006/math" xmlns:a14="http://schemas.microsoft.com/office/drawing/2010/main" xmlns:ma14="http://schemas.microsoft.com/office/mac/drawingml/2011/main" val="1"/>
+              <ma14:wrappingTextBoxFlag xmlns:ma14="http://schemas.microsoft.com/office/mac/drawingml/2011/main" xmlns:a14="http://schemas.microsoft.com/office/drawing/2010/main" xmlns:m="http://schemas.openxmlformats.org/officeDocument/2006/math" xmlns="" val="1"/>
             </a:ext>
           </a:extLst>
         </p:spPr>
@@ -1264,7 +1264,7 @@
           </a:ln>
           <a:extLst>
             <a:ext uri="{C572A759-6A51-4108-AA02-DFA0A04FC94B}">
-              <ma14:wrappingTextBoxFlag xmlns="" xmlns:m="http://schemas.openxmlformats.org/officeDocument/2006/math" xmlns:a14="http://schemas.microsoft.com/office/drawing/2010/main" xmlns:ma14="http://schemas.microsoft.com/office/mac/drawingml/2011/main" val="1"/>
+              <ma14:wrappingTextBoxFlag xmlns:ma14="http://schemas.microsoft.com/office/mac/drawingml/2011/main" xmlns:a14="http://schemas.microsoft.com/office/drawing/2010/main" xmlns:m="http://schemas.openxmlformats.org/officeDocument/2006/math" xmlns="" val="1"/>
             </a:ext>
           </a:extLst>
         </p:spPr>
@@ -1303,7 +1303,7 @@
           </a:ln>
           <a:extLst>
             <a:ext uri="{C572A759-6A51-4108-AA02-DFA0A04FC94B}">
-              <ma14:wrappingTextBoxFlag xmlns="" xmlns:m="http://schemas.openxmlformats.org/officeDocument/2006/math" xmlns:a14="http://schemas.microsoft.com/office/drawing/2010/main" xmlns:ma14="http://schemas.microsoft.com/office/mac/drawingml/2011/main" val="1"/>
+              <ma14:wrappingTextBoxFlag xmlns:ma14="http://schemas.microsoft.com/office/mac/drawingml/2011/main" xmlns:a14="http://schemas.microsoft.com/office/drawing/2010/main" xmlns:m="http://schemas.openxmlformats.org/officeDocument/2006/math" xmlns="" val="1"/>
             </a:ext>
           </a:extLst>
         </p:spPr>
@@ -1395,7 +1395,7 @@
           </a:ln>
           <a:extLst>
             <a:ext uri="{C572A759-6A51-4108-AA02-DFA0A04FC94B}">
-              <ma14:wrappingTextBoxFlag xmlns="" xmlns:m="http://schemas.openxmlformats.org/officeDocument/2006/math" xmlns:a14="http://schemas.microsoft.com/office/drawing/2010/main" xmlns:ma14="http://schemas.microsoft.com/office/mac/drawingml/2011/main" val="1"/>
+              <ma14:wrappingTextBoxFlag xmlns:ma14="http://schemas.microsoft.com/office/mac/drawingml/2011/main" xmlns:a14="http://schemas.microsoft.com/office/drawing/2010/main" xmlns:m="http://schemas.openxmlformats.org/officeDocument/2006/math" xmlns="" val="1"/>
             </a:ext>
           </a:extLst>
         </p:spPr>
@@ -2761,7 +2761,7 @@
         <p:spPr/>
         <p:txBody>
           <a:bodyPr>
-            <a:normAutofit/>
+            <a:normAutofit lnSpcReduction="10000"/>
           </a:bodyPr>
           <a:lstStyle/>
           <a:p>
@@ -2782,6 +2782,14 @@
             <a:r>
               <a:rPr lang="en-US" dirty="0"/>
               <a:t>Runs on BEAM as well</a:t>
+            </a:r>
+            <a:endParaRPr lang="bg-BG" dirty="0"/>
+          </a:p>
+          <a:p>
+            <a:pPr lvl="1"/>
+            <a:r>
+              <a:rPr lang="en-US" dirty="0"/>
+              <a:t>Used by Discord and Pinterest</a:t>
             </a:r>
           </a:p>
           <a:p>
@@ -5161,21 +5169,6 @@
 </file>
 
 <file path=customXml/item1.xml><?xml version="1.0" encoding="utf-8"?>
-<p:properties xmlns:p="http://schemas.microsoft.com/office/2006/metadata/properties" xmlns:xsi="http://www.w3.org/2001/XMLSchema-instance" xmlns:pc="http://schemas.microsoft.com/office/infopath/2007/PartnerControls">
-  <documentManagement/>
-</p:properties>
-</file>
-
-<file path=customXml/item2.xml><?xml version="1.0" encoding="utf-8"?>
-<?mso-contentType ?>
-<FormTemplates xmlns="http://schemas.microsoft.com/sharepoint/v3/contenttype/forms">
-  <Display>DocumentLibraryForm</Display>
-  <Edit>DocumentLibraryForm</Edit>
-  <New>DocumentLibraryForm</New>
-</FormTemplates>
-</file>
-
-<file path=customXml/item3.xml><?xml version="1.0" encoding="utf-8"?>
 <ct:contentTypeSchema xmlns:ct="http://schemas.microsoft.com/office/2006/metadata/contentType" xmlns:ma="http://schemas.microsoft.com/office/2006/metadata/properties/metaAttributes" ct:_="" ma:_="" ma:contentTypeName="Document" ma:contentTypeID="0x0101004FE2915043E30E43AE6BD266BA7C260E" ma:contentTypeVersion="10" ma:contentTypeDescription="Create a new document." ma:contentTypeScope="" ma:versionID="2be7ab3cc8b59e7568c8f4ab777f1af6">
   <xsd:schema xmlns:xsd="http://www.w3.org/2001/XMLSchema" xmlns:xs="http://www.w3.org/2001/XMLSchema" xmlns:p="http://schemas.microsoft.com/office/2006/metadata/properties" xmlns:ns2="e4ee0c53-2d94-43da-a56a-ee2266385724" xmlns:ns3="649eb69c-f108-4a9e-8f42-09f1f02c87f5" targetNamespace="http://schemas.microsoft.com/office/2006/metadata/properties" ma:root="true" ma:fieldsID="65b55a7f7c772a96aad2501ed6708a0d" ns2:_="" ns3:_="">
     <xsd:import namespace="e4ee0c53-2d94-43da-a56a-ee2266385724"/>
@@ -5378,24 +5371,22 @@
 </ct:contentTypeSchema>
 </file>
 
-<file path=customXml/itemProps1.xml><?xml version="1.0" encoding="utf-8"?>
-<ds:datastoreItem xmlns:ds="http://schemas.openxmlformats.org/officeDocument/2006/customXml" ds:itemID="{28013F97-F744-428B-8504-911AB7D87FBC}">
-  <ds:schemaRefs>
-    <ds:schemaRef ds:uri="http://schemas.microsoft.com/office/2006/metadata/properties"/>
-    <ds:schemaRef ds:uri="http://schemas.microsoft.com/office/infopath/2007/PartnerControls"/>
-  </ds:schemaRefs>
-</ds:datastoreItem>
+<file path=customXml/item2.xml><?xml version="1.0" encoding="utf-8"?>
+<?mso-contentType ?>
+<FormTemplates xmlns="http://schemas.microsoft.com/sharepoint/v3/contenttype/forms">
+  <Display>DocumentLibraryForm</Display>
+  <Edit>DocumentLibraryForm</Edit>
+  <New>DocumentLibraryForm</New>
+</FormTemplates>
 </file>
 
-<file path=customXml/itemProps2.xml><?xml version="1.0" encoding="utf-8"?>
-<ds:datastoreItem xmlns:ds="http://schemas.openxmlformats.org/officeDocument/2006/customXml" ds:itemID="{450D9D61-AB1C-42DB-97B3-F16948BBEDA5}">
-  <ds:schemaRefs>
-    <ds:schemaRef ds:uri="http://schemas.microsoft.com/sharepoint/v3/contenttype/forms"/>
-  </ds:schemaRefs>
-</ds:datastoreItem>
+<file path=customXml/item3.xml><?xml version="1.0" encoding="utf-8"?>
+<p:properties xmlns:p="http://schemas.microsoft.com/office/2006/metadata/properties" xmlns:xsi="http://www.w3.org/2001/XMLSchema-instance" xmlns:pc="http://schemas.microsoft.com/office/infopath/2007/PartnerControls">
+  <documentManagement/>
+</p:properties>
 </file>
 
-<file path=customXml/itemProps3.xml><?xml version="1.0" encoding="utf-8"?>
+<file path=customXml/itemProps1.xml><?xml version="1.0" encoding="utf-8"?>
 <ds:datastoreItem xmlns:ds="http://schemas.openxmlformats.org/officeDocument/2006/customXml" ds:itemID="{7BCD7B8E-9E4C-43E9-8D0A-A2FE873E7128}">
   <ds:schemaRefs>
     <ds:schemaRef ds:uri="http://schemas.microsoft.com/office/2006/metadata/contentType"/>
@@ -5412,4 +5403,21 @@
     <ds:schemaRef ds:uri="http://schemas.microsoft.com/internal/obd"/>
   </ds:schemaRefs>
 </ds:datastoreItem>
+</file>
+
+<file path=customXml/itemProps2.xml><?xml version="1.0" encoding="utf-8"?>
+<ds:datastoreItem xmlns:ds="http://schemas.openxmlformats.org/officeDocument/2006/customXml" ds:itemID="{450D9D61-AB1C-42DB-97B3-F16948BBEDA5}">
+  <ds:schemaRefs>
+    <ds:schemaRef ds:uri="http://schemas.microsoft.com/sharepoint/v3/contenttype/forms"/>
+  </ds:schemaRefs>
+</ds:datastoreItem>
+</file>
+
+<file path=customXml/itemProps3.xml><?xml version="1.0" encoding="utf-8"?>
+<ds:datastoreItem xmlns:ds="http://schemas.openxmlformats.org/officeDocument/2006/customXml" ds:itemID="{28013F97-F744-428B-8504-911AB7D87FBC}">
+  <ds:schemaRefs>
+    <ds:schemaRef ds:uri="http://schemas.microsoft.com/office/2006/metadata/properties"/>
+    <ds:schemaRef ds:uri="http://schemas.microsoft.com/office/infopath/2007/PartnerControls"/>
+  </ds:schemaRefs>
+</ds:datastoreItem>
 </file>
</xml_diff>

<commit_message>
Added slides for language and environment features
</commit_message>
<xml_diff>
--- a/Elixir Tech Talk.pptx
+++ b/Elixir Tech Talk.pptx
@@ -5,14 +5,22 @@
     <p:sldMasterId id="2147483648" r:id="rId4"/>
   </p:sldMasterIdLst>
   <p:notesMasterIdLst>
-    <p:notesMasterId r:id="rId10"/>
+    <p:notesMasterId r:id="rId18"/>
   </p:notesMasterIdLst>
   <p:sldIdLst>
     <p:sldId id="258" r:id="rId5"/>
     <p:sldId id="259" r:id="rId6"/>
     <p:sldId id="260" r:id="rId7"/>
     <p:sldId id="273" r:id="rId8"/>
-    <p:sldId id="272" r:id="rId9"/>
+    <p:sldId id="279" r:id="rId9"/>
+    <p:sldId id="275" r:id="rId10"/>
+    <p:sldId id="276" r:id="rId11"/>
+    <p:sldId id="274" r:id="rId12"/>
+    <p:sldId id="277" r:id="rId13"/>
+    <p:sldId id="278" r:id="rId14"/>
+    <p:sldId id="272" r:id="rId15"/>
+    <p:sldId id="281" r:id="rId16"/>
+    <p:sldId id="282" r:id="rId17"/>
   </p:sldIdLst>
   <p:sldSz cx="12192000" cy="6858000"/>
   <p:notesSz cx="6858000" cy="9144000"/>
@@ -555,6 +563,72 @@
 </p:notes>
 </file>
 
+<file path=ppt/notesSlides/notesSlide2.xml><?xml version="1.0" encoding="utf-8"?>
+<p:notes xmlns:a="http://schemas.openxmlformats.org/drawingml/2006/main" xmlns:r="http://schemas.openxmlformats.org/officeDocument/2006/relationships" xmlns:p="http://schemas.openxmlformats.org/presentationml/2006/main">
+  <p:cSld>
+    <p:spTree>
+      <p:nvGrpSpPr>
+        <p:cNvPr id="1" name=""/>
+        <p:cNvGrpSpPr/>
+        <p:nvPr/>
+      </p:nvGrpSpPr>
+      <p:grpSpPr>
+        <a:xfrm>
+          <a:off x="0" y="0"/>
+          <a:ext cx="0" cy="0"/>
+          <a:chOff x="0" y="0"/>
+          <a:chExt cx="0" cy="0"/>
+        </a:xfrm>
+      </p:grpSpPr>
+      <p:sp>
+        <p:nvSpPr>
+          <p:cNvPr id="2" name="Slide Image Placeholder 1"/>
+          <p:cNvSpPr>
+            <a:spLocks noGrp="1" noRot="1" noChangeAspect="1"/>
+          </p:cNvSpPr>
+          <p:nvPr>
+            <p:ph type="sldImg"/>
+          </p:nvPr>
+        </p:nvSpPr>
+        <p:spPr>
+          <a:xfrm>
+            <a:off x="381000" y="685800"/>
+            <a:ext cx="6096000" cy="3429000"/>
+          </a:xfrm>
+        </p:spPr>
+      </p:sp>
+      <p:sp>
+        <p:nvSpPr>
+          <p:cNvPr id="3" name="Notes Placeholder 2"/>
+          <p:cNvSpPr>
+            <a:spLocks noGrp="1"/>
+          </p:cNvSpPr>
+          <p:nvPr>
+            <p:ph type="body" idx="1"/>
+          </p:nvPr>
+        </p:nvSpPr>
+        <p:spPr/>
+        <p:txBody>
+          <a:bodyPr/>
+          <a:lstStyle/>
+          <a:p>
+            <a:endParaRPr lang="en-US" dirty="0"/>
+          </a:p>
+        </p:txBody>
+      </p:sp>
+    </p:spTree>
+    <p:extLst>
+      <p:ext uri="{BB962C8B-B14F-4D97-AF65-F5344CB8AC3E}">
+        <p14:creationId xmlns:p14="http://schemas.microsoft.com/office/powerpoint/2010/main" val="3116644602"/>
+      </p:ext>
+    </p:extLst>
+  </p:cSld>
+  <p:clrMapOvr>
+    <a:masterClrMapping/>
+  </p:clrMapOvr>
+</p:notes>
+</file>
+
 <file path=ppt/slideLayouts/slideLayout1.xml><?xml version="1.0" encoding="utf-8"?>
 <p:sldLayout xmlns:a="http://schemas.openxmlformats.org/drawingml/2006/main" xmlns:r="http://schemas.openxmlformats.org/officeDocument/2006/relationships" xmlns:p="http://schemas.openxmlformats.org/presentationml/2006/main" showMasterSp="0" type="title">
   <p:cSld name="Title Slide">
@@ -737,7 +811,7 @@
           </a:ln>
           <a:extLst>
             <a:ext uri="{C572A759-6A51-4108-AA02-DFA0A04FC94B}">
-              <ma14:wrappingTextBoxFlag xmlns:ma14="http://schemas.microsoft.com/office/mac/drawingml/2011/main" xmlns:a14="http://schemas.microsoft.com/office/drawing/2010/main" xmlns:m="http://schemas.openxmlformats.org/officeDocument/2006/math" xmlns="" val="1"/>
+              <ma14:wrappingTextBoxFlag xmlns="" xmlns:m="http://schemas.openxmlformats.org/officeDocument/2006/math" xmlns:a14="http://schemas.microsoft.com/office/drawing/2010/main" xmlns:ma14="http://schemas.microsoft.com/office/mac/drawingml/2011/main" val="1"/>
             </a:ext>
           </a:extLst>
         </p:spPr>
@@ -1005,7 +1079,7 @@
           </a:ln>
           <a:extLst>
             <a:ext uri="{C572A759-6A51-4108-AA02-DFA0A04FC94B}">
-              <ma14:wrappingTextBoxFlag xmlns:ma14="http://schemas.microsoft.com/office/mac/drawingml/2011/main" xmlns:a14="http://schemas.microsoft.com/office/drawing/2010/main" xmlns:m="http://schemas.openxmlformats.org/officeDocument/2006/math" xmlns="" val="1"/>
+              <ma14:wrappingTextBoxFlag xmlns="" xmlns:m="http://schemas.openxmlformats.org/officeDocument/2006/math" xmlns:a14="http://schemas.microsoft.com/office/drawing/2010/main" xmlns:ma14="http://schemas.microsoft.com/office/mac/drawingml/2011/main" val="1"/>
             </a:ext>
           </a:extLst>
         </p:spPr>
@@ -1264,7 +1338,7 @@
           </a:ln>
           <a:extLst>
             <a:ext uri="{C572A759-6A51-4108-AA02-DFA0A04FC94B}">
-              <ma14:wrappingTextBoxFlag xmlns:ma14="http://schemas.microsoft.com/office/mac/drawingml/2011/main" xmlns:a14="http://schemas.microsoft.com/office/drawing/2010/main" xmlns:m="http://schemas.openxmlformats.org/officeDocument/2006/math" xmlns="" val="1"/>
+              <ma14:wrappingTextBoxFlag xmlns="" xmlns:m="http://schemas.openxmlformats.org/officeDocument/2006/math" xmlns:a14="http://schemas.microsoft.com/office/drawing/2010/main" xmlns:ma14="http://schemas.microsoft.com/office/mac/drawingml/2011/main" val="1"/>
             </a:ext>
           </a:extLst>
         </p:spPr>
@@ -1303,7 +1377,7 @@
           </a:ln>
           <a:extLst>
             <a:ext uri="{C572A759-6A51-4108-AA02-DFA0A04FC94B}">
-              <ma14:wrappingTextBoxFlag xmlns:ma14="http://schemas.microsoft.com/office/mac/drawingml/2011/main" xmlns:a14="http://schemas.microsoft.com/office/drawing/2010/main" xmlns:m="http://schemas.openxmlformats.org/officeDocument/2006/math" xmlns="" val="1"/>
+              <ma14:wrappingTextBoxFlag xmlns="" xmlns:m="http://schemas.openxmlformats.org/officeDocument/2006/math" xmlns:a14="http://schemas.microsoft.com/office/drawing/2010/main" xmlns:ma14="http://schemas.microsoft.com/office/mac/drawingml/2011/main" val="1"/>
             </a:ext>
           </a:extLst>
         </p:spPr>
@@ -1395,7 +1469,7 @@
           </a:ln>
           <a:extLst>
             <a:ext uri="{C572A759-6A51-4108-AA02-DFA0A04FC94B}">
-              <ma14:wrappingTextBoxFlag xmlns:ma14="http://schemas.microsoft.com/office/mac/drawingml/2011/main" xmlns:a14="http://schemas.microsoft.com/office/drawing/2010/main" xmlns:m="http://schemas.openxmlformats.org/officeDocument/2006/math" xmlns="" val="1"/>
+              <ma14:wrappingTextBoxFlag xmlns="" xmlns:m="http://schemas.openxmlformats.org/officeDocument/2006/math" xmlns:a14="http://schemas.microsoft.com/office/drawing/2010/main" xmlns:ma14="http://schemas.microsoft.com/office/mac/drawingml/2011/main" val="1"/>
             </a:ext>
           </a:extLst>
         </p:spPr>
@@ -2348,14 +2422,14 @@
           <a:p>
             <a:r>
               <a:rPr lang="en-US" sz="6000" dirty="0"/>
-              <a:t>Why Elixir is better</a:t>
+              <a:t>Elixir is better</a:t>
             </a:r>
             <a:br>
               <a:rPr lang="en-US" sz="6000" dirty="0"/>
             </a:br>
             <a:r>
               <a:rPr lang="en-US" sz="6000" dirty="0"/>
-              <a:t>than C# and Java</a:t>
+              <a:t>than C# and Java?</a:t>
             </a:r>
           </a:p>
         </p:txBody>
@@ -2394,6 +2468,540 @@
     <p:extLst>
       <p:ext uri="{BB962C8B-B14F-4D97-AF65-F5344CB8AC3E}">
         <p14:creationId xmlns:p14="http://schemas.microsoft.com/office/powerpoint/2010/main" val="2892663331"/>
+      </p:ext>
+    </p:extLst>
+  </p:cSld>
+  <p:clrMapOvr>
+    <a:masterClrMapping/>
+  </p:clrMapOvr>
+  <p:transition spd="med"/>
+</p:sld>
+</file>
+
+<file path=ppt/slides/slide10.xml><?xml version="1.0" encoding="utf-8"?>
+<p:sld xmlns:a="http://schemas.openxmlformats.org/drawingml/2006/main" xmlns:r="http://schemas.openxmlformats.org/officeDocument/2006/relationships" xmlns:p="http://schemas.openxmlformats.org/presentationml/2006/main">
+  <p:cSld>
+    <p:spTree>
+      <p:nvGrpSpPr>
+        <p:cNvPr id="1" name=""/>
+        <p:cNvGrpSpPr/>
+        <p:nvPr/>
+      </p:nvGrpSpPr>
+      <p:grpSpPr>
+        <a:xfrm>
+          <a:off x="0" y="0"/>
+          <a:ext cx="0" cy="0"/>
+          <a:chOff x="0" y="0"/>
+          <a:chExt cx="0" cy="0"/>
+        </a:xfrm>
+      </p:grpSpPr>
+      <p:sp>
+        <p:nvSpPr>
+          <p:cNvPr id="2" name="Title 1">
+            <a:extLst>
+              <a:ext uri="{FF2B5EF4-FFF2-40B4-BE49-F238E27FC236}">
+                <a16:creationId xmlns:a16="http://schemas.microsoft.com/office/drawing/2014/main" id="{C1FC6DE6-B506-4DD3-BF06-3B48398B8433}"/>
+              </a:ext>
+            </a:extLst>
+          </p:cNvPr>
+          <p:cNvSpPr>
+            <a:spLocks noGrp="1"/>
+          </p:cNvSpPr>
+          <p:nvPr>
+            <p:ph type="title"/>
+          </p:nvPr>
+        </p:nvSpPr>
+        <p:spPr/>
+        <p:txBody>
+          <a:bodyPr/>
+          <a:lstStyle/>
+          <a:p>
+            <a:r>
+              <a:rPr lang="en-US" dirty="0"/>
+              <a:t>Pattern matching</a:t>
+            </a:r>
+          </a:p>
+        </p:txBody>
+      </p:sp>
+      <p:sp>
+        <p:nvSpPr>
+          <p:cNvPr id="3" name="Text Placeholder 2">
+            <a:extLst>
+              <a:ext uri="{FF2B5EF4-FFF2-40B4-BE49-F238E27FC236}">
+                <a16:creationId xmlns:a16="http://schemas.microsoft.com/office/drawing/2014/main" id="{C2EFC31B-1473-4AE2-8054-FBBE022B1B02}"/>
+              </a:ext>
+            </a:extLst>
+          </p:cNvPr>
+          <p:cNvSpPr>
+            <a:spLocks noGrp="1"/>
+          </p:cNvSpPr>
+          <p:nvPr>
+            <p:ph type="body" idx="1"/>
+          </p:nvPr>
+        </p:nvSpPr>
+        <p:spPr/>
+        <p:txBody>
+          <a:bodyPr/>
+          <a:lstStyle/>
+          <a:p>
+            <a:r>
+              <a:rPr lang="en-US" dirty="0"/>
+              <a:t>A technique popular in functional languages</a:t>
+            </a:r>
+          </a:p>
+          <a:p>
+            <a:endParaRPr lang="en-US" dirty="0"/>
+          </a:p>
+          <a:p>
+            <a:r>
+              <a:rPr lang="en-US" dirty="0"/>
+              <a:t>Test whether the object matches a given expression</a:t>
+            </a:r>
+          </a:p>
+          <a:p>
+            <a:endParaRPr lang="en-US" dirty="0"/>
+          </a:p>
+          <a:p>
+            <a:r>
+              <a:rPr lang="en-US" dirty="0"/>
+              <a:t>Used for cleaner control flow statements</a:t>
+            </a:r>
+          </a:p>
+          <a:p>
+            <a:endParaRPr lang="en-US" dirty="0"/>
+          </a:p>
+          <a:p>
+            <a:r>
+              <a:rPr lang="en-US" dirty="0"/>
+              <a:t>See demo</a:t>
+            </a:r>
+          </a:p>
+        </p:txBody>
+      </p:sp>
+    </p:spTree>
+    <p:extLst>
+      <p:ext uri="{BB962C8B-B14F-4D97-AF65-F5344CB8AC3E}">
+        <p14:creationId xmlns:p14="http://schemas.microsoft.com/office/powerpoint/2010/main" val="209218498"/>
+      </p:ext>
+    </p:extLst>
+  </p:cSld>
+  <p:clrMapOvr>
+    <a:masterClrMapping/>
+  </p:clrMapOvr>
+  <p:transition spd="med"/>
+</p:sld>
+</file>
+
+<file path=ppt/slides/slide11.xml><?xml version="1.0" encoding="utf-8"?>
+<p:sld xmlns:a="http://schemas.openxmlformats.org/drawingml/2006/main" xmlns:r="http://schemas.openxmlformats.org/officeDocument/2006/relationships" xmlns:p="http://schemas.openxmlformats.org/presentationml/2006/main">
+  <p:cSld>
+    <p:spTree>
+      <p:nvGrpSpPr>
+        <p:cNvPr id="1" name=""/>
+        <p:cNvGrpSpPr/>
+        <p:nvPr/>
+      </p:nvGrpSpPr>
+      <p:grpSpPr>
+        <a:xfrm>
+          <a:off x="0" y="0"/>
+          <a:ext cx="0" cy="0"/>
+          <a:chOff x="0" y="0"/>
+          <a:chExt cx="0" cy="0"/>
+        </a:xfrm>
+      </p:grpSpPr>
+      <p:sp>
+        <p:nvSpPr>
+          <p:cNvPr id="4" name="Title 3">
+            <a:extLst>
+              <a:ext uri="{FF2B5EF4-FFF2-40B4-BE49-F238E27FC236}">
+                <a16:creationId xmlns:a16="http://schemas.microsoft.com/office/drawing/2014/main" id="{0B5E89EB-6726-48BB-A178-4BC22FD7EFD1}"/>
+              </a:ext>
+            </a:extLst>
+          </p:cNvPr>
+          <p:cNvSpPr>
+            <a:spLocks noGrp="1"/>
+          </p:cNvSpPr>
+          <p:nvPr>
+            <p:ph type="title"/>
+          </p:nvPr>
+        </p:nvSpPr>
+        <p:spPr>
+          <a:xfrm>
+            <a:off x="885440" y="1597396"/>
+            <a:ext cx="4939048" cy="1076082"/>
+          </a:xfrm>
+        </p:spPr>
+        <p:txBody>
+          <a:bodyPr/>
+          <a:lstStyle/>
+          <a:p>
+            <a:r>
+              <a:rPr lang="en-US" dirty="0"/>
+              <a:t>Demo</a:t>
+            </a:r>
+          </a:p>
+        </p:txBody>
+      </p:sp>
+      <p:sp>
+        <p:nvSpPr>
+          <p:cNvPr id="5" name="Text Placeholder 4">
+            <a:extLst>
+              <a:ext uri="{FF2B5EF4-FFF2-40B4-BE49-F238E27FC236}">
+                <a16:creationId xmlns:a16="http://schemas.microsoft.com/office/drawing/2014/main" id="{D92FCB95-0201-4B34-8F73-1B60BBEDA319}"/>
+              </a:ext>
+            </a:extLst>
+          </p:cNvPr>
+          <p:cNvSpPr>
+            <a:spLocks noGrp="1"/>
+          </p:cNvSpPr>
+          <p:nvPr>
+            <p:ph type="body" sz="quarter" idx="1"/>
+          </p:nvPr>
+        </p:nvSpPr>
+        <p:spPr>
+          <a:xfrm>
+            <a:off x="885440" y="2805606"/>
+            <a:ext cx="5031977" cy="1246787"/>
+          </a:xfrm>
+        </p:spPr>
+        <p:txBody>
+          <a:bodyPr/>
+          <a:lstStyle/>
+          <a:p>
+            <a:endParaRPr lang="en-US" dirty="0"/>
+          </a:p>
+        </p:txBody>
+      </p:sp>
+      <p:pic>
+        <p:nvPicPr>
+          <p:cNvPr id="2050" name="Picture 2">
+            <a:extLst>
+              <a:ext uri="{FF2B5EF4-FFF2-40B4-BE49-F238E27FC236}">
+                <a16:creationId xmlns:a16="http://schemas.microsoft.com/office/drawing/2014/main" id="{00A4FE67-659A-44B9-A2F9-A88C6BE1E64C}"/>
+              </a:ext>
+            </a:extLst>
+          </p:cNvPr>
+          <p:cNvPicPr>
+            <a:picLocks noChangeAspect="1" noChangeArrowheads="1"/>
+          </p:cNvPicPr>
+          <p:nvPr/>
+        </p:nvPicPr>
+        <p:blipFill>
+          <a:blip r:embed="rId3">
+            <a:extLst>
+              <a:ext uri="{28A0092B-C50C-407E-A947-70E740481C1C}">
+                <a14:useLocalDpi xmlns:a14="http://schemas.microsoft.com/office/drawing/2010/main" val="0"/>
+              </a:ext>
+            </a:extLst>
+          </a:blip>
+          <a:srcRect/>
+          <a:stretch>
+            <a:fillRect/>
+          </a:stretch>
+        </p:blipFill>
+        <p:spPr bwMode="auto">
+          <a:xfrm>
+            <a:off x="5160320" y="1387603"/>
+            <a:ext cx="2571750" cy="2571750"/>
+          </a:xfrm>
+          <a:prstGeom prst="rect">
+            <a:avLst/>
+          </a:prstGeom>
+          <a:noFill/>
+          <a:extLst>
+            <a:ext uri="{909E8E84-426E-40DD-AFC4-6F175D3DCCD1}">
+              <a14:hiddenFill xmlns:a14="http://schemas.microsoft.com/office/drawing/2010/main">
+                <a:solidFill>
+                  <a:srgbClr val="FFFFFF"/>
+                </a:solidFill>
+              </a14:hiddenFill>
+            </a:ext>
+          </a:extLst>
+        </p:spPr>
+      </p:pic>
+    </p:spTree>
+    <p:extLst>
+      <p:ext uri="{BB962C8B-B14F-4D97-AF65-F5344CB8AC3E}">
+        <p14:creationId xmlns:p14="http://schemas.microsoft.com/office/powerpoint/2010/main" val="2820332712"/>
+      </p:ext>
+    </p:extLst>
+  </p:cSld>
+  <p:clrMapOvr>
+    <a:masterClrMapping/>
+  </p:clrMapOvr>
+  <p:transition spd="med"/>
+</p:sld>
+</file>
+
+<file path=ppt/slides/slide12.xml><?xml version="1.0" encoding="utf-8"?>
+<p:sld xmlns:a="http://schemas.openxmlformats.org/drawingml/2006/main" xmlns:r="http://schemas.openxmlformats.org/officeDocument/2006/relationships" xmlns:p="http://schemas.openxmlformats.org/presentationml/2006/main">
+  <p:cSld>
+    <p:spTree>
+      <p:nvGrpSpPr>
+        <p:cNvPr id="1" name=""/>
+        <p:cNvGrpSpPr/>
+        <p:nvPr/>
+      </p:nvGrpSpPr>
+      <p:grpSpPr>
+        <a:xfrm>
+          <a:off x="0" y="0"/>
+          <a:ext cx="0" cy="0"/>
+          <a:chOff x="0" y="0"/>
+          <a:chExt cx="0" cy="0"/>
+        </a:xfrm>
+      </p:grpSpPr>
+      <p:sp>
+        <p:nvSpPr>
+          <p:cNvPr id="2" name="Title 1">
+            <a:extLst>
+              <a:ext uri="{FF2B5EF4-FFF2-40B4-BE49-F238E27FC236}">
+                <a16:creationId xmlns:a16="http://schemas.microsoft.com/office/drawing/2014/main" id="{5AF44A67-B6FB-4575-B032-95A9E47F8C1C}"/>
+              </a:ext>
+            </a:extLst>
+          </p:cNvPr>
+          <p:cNvSpPr>
+            <a:spLocks noGrp="1"/>
+          </p:cNvSpPr>
+          <p:nvPr>
+            <p:ph type="title"/>
+          </p:nvPr>
+        </p:nvSpPr>
+        <p:spPr/>
+        <p:txBody>
+          <a:bodyPr/>
+          <a:lstStyle/>
+          <a:p>
+            <a:r>
+              <a:rPr lang="en-US" dirty="0"/>
+              <a:t>REPL and </a:t>
+            </a:r>
+            <a:r>
+              <a:rPr lang="en-US" dirty="0" err="1"/>
+              <a:t>doctests</a:t>
+            </a:r>
+            <a:endParaRPr lang="en-US" dirty="0"/>
+          </a:p>
+        </p:txBody>
+      </p:sp>
+      <p:sp>
+        <p:nvSpPr>
+          <p:cNvPr id="3" name="Text Placeholder 2">
+            <a:extLst>
+              <a:ext uri="{FF2B5EF4-FFF2-40B4-BE49-F238E27FC236}">
+                <a16:creationId xmlns:a16="http://schemas.microsoft.com/office/drawing/2014/main" id="{564FC978-9800-4DCC-A901-81D68DD65AC8}"/>
+              </a:ext>
+            </a:extLst>
+          </p:cNvPr>
+          <p:cNvSpPr>
+            <a:spLocks noGrp="1"/>
+          </p:cNvSpPr>
+          <p:nvPr>
+            <p:ph type="body" idx="1"/>
+          </p:nvPr>
+        </p:nvSpPr>
+        <p:spPr/>
+        <p:txBody>
+          <a:bodyPr/>
+          <a:lstStyle/>
+          <a:p>
+            <a:r>
+              <a:rPr lang="en-US" dirty="0"/>
+              <a:t>Elixir has a built-in REPL (Read–eval–print loop)</a:t>
+            </a:r>
+          </a:p>
+          <a:p>
+            <a:pPr lvl="1"/>
+            <a:r>
+              <a:rPr lang="en-US" dirty="0"/>
+              <a:t>Can execute simple expressions</a:t>
+            </a:r>
+          </a:p>
+          <a:p>
+            <a:pPr lvl="1"/>
+            <a:r>
+              <a:rPr lang="en-US" dirty="0"/>
+              <a:t>Can be started as part of the project</a:t>
+            </a:r>
+          </a:p>
+          <a:p>
+            <a:pPr lvl="1"/>
+            <a:r>
+              <a:rPr lang="en-US" dirty="0"/>
+              <a:t>Can be attached to a running project</a:t>
+            </a:r>
+          </a:p>
+          <a:p>
+            <a:pPr lvl="1"/>
+            <a:endParaRPr lang="en-US" dirty="0"/>
+          </a:p>
+          <a:p>
+            <a:r>
+              <a:rPr lang="en-US" dirty="0" err="1"/>
+              <a:t>Doctests</a:t>
+            </a:r>
+            <a:endParaRPr lang="en-US" dirty="0"/>
+          </a:p>
+          <a:p>
+            <a:pPr lvl="1"/>
+            <a:r>
+              <a:rPr lang="en-US" dirty="0"/>
+              <a:t>A mix between unit tests and documentation</a:t>
+            </a:r>
+          </a:p>
+          <a:p>
+            <a:pPr lvl="1"/>
+            <a:r>
+              <a:rPr lang="en-US" dirty="0"/>
+              <a:t>Help keeping the documentation up to date</a:t>
+            </a:r>
+          </a:p>
+        </p:txBody>
+      </p:sp>
+    </p:spTree>
+    <p:extLst>
+      <p:ext uri="{BB962C8B-B14F-4D97-AF65-F5344CB8AC3E}">
+        <p14:creationId xmlns:p14="http://schemas.microsoft.com/office/powerpoint/2010/main" val="996726445"/>
+      </p:ext>
+    </p:extLst>
+  </p:cSld>
+  <p:clrMapOvr>
+    <a:masterClrMapping/>
+  </p:clrMapOvr>
+  <p:transition spd="med"/>
+</p:sld>
+</file>
+
+<file path=ppt/slides/slide13.xml><?xml version="1.0" encoding="utf-8"?>
+<p:sld xmlns:a="http://schemas.openxmlformats.org/drawingml/2006/main" xmlns:r="http://schemas.openxmlformats.org/officeDocument/2006/relationships" xmlns:p="http://schemas.openxmlformats.org/presentationml/2006/main">
+  <p:cSld>
+    <p:spTree>
+      <p:nvGrpSpPr>
+        <p:cNvPr id="1" name=""/>
+        <p:cNvGrpSpPr/>
+        <p:nvPr/>
+      </p:nvGrpSpPr>
+      <p:grpSpPr>
+        <a:xfrm>
+          <a:off x="0" y="0"/>
+          <a:ext cx="0" cy="0"/>
+          <a:chOff x="0" y="0"/>
+          <a:chExt cx="0" cy="0"/>
+        </a:xfrm>
+      </p:grpSpPr>
+      <p:sp>
+        <p:nvSpPr>
+          <p:cNvPr id="4" name="Title 3">
+            <a:extLst>
+              <a:ext uri="{FF2B5EF4-FFF2-40B4-BE49-F238E27FC236}">
+                <a16:creationId xmlns:a16="http://schemas.microsoft.com/office/drawing/2014/main" id="{0B5E89EB-6726-48BB-A178-4BC22FD7EFD1}"/>
+              </a:ext>
+            </a:extLst>
+          </p:cNvPr>
+          <p:cNvSpPr>
+            <a:spLocks noGrp="1"/>
+          </p:cNvSpPr>
+          <p:nvPr>
+            <p:ph type="title"/>
+          </p:nvPr>
+        </p:nvSpPr>
+        <p:spPr>
+          <a:xfrm>
+            <a:off x="885440" y="1597396"/>
+            <a:ext cx="4939048" cy="1076082"/>
+          </a:xfrm>
+        </p:spPr>
+        <p:txBody>
+          <a:bodyPr/>
+          <a:lstStyle/>
+          <a:p>
+            <a:r>
+              <a:rPr lang="en-US" dirty="0"/>
+              <a:t>Demo</a:t>
+            </a:r>
+          </a:p>
+        </p:txBody>
+      </p:sp>
+      <p:sp>
+        <p:nvSpPr>
+          <p:cNvPr id="5" name="Text Placeholder 4">
+            <a:extLst>
+              <a:ext uri="{FF2B5EF4-FFF2-40B4-BE49-F238E27FC236}">
+                <a16:creationId xmlns:a16="http://schemas.microsoft.com/office/drawing/2014/main" id="{D92FCB95-0201-4B34-8F73-1B60BBEDA319}"/>
+              </a:ext>
+            </a:extLst>
+          </p:cNvPr>
+          <p:cNvSpPr>
+            <a:spLocks noGrp="1"/>
+          </p:cNvSpPr>
+          <p:nvPr>
+            <p:ph type="body" sz="quarter" idx="1"/>
+          </p:nvPr>
+        </p:nvSpPr>
+        <p:spPr>
+          <a:xfrm>
+            <a:off x="885440" y="2805606"/>
+            <a:ext cx="5031977" cy="1246787"/>
+          </a:xfrm>
+        </p:spPr>
+        <p:txBody>
+          <a:bodyPr/>
+          <a:lstStyle/>
+          <a:p>
+            <a:endParaRPr lang="en-US" dirty="0"/>
+          </a:p>
+        </p:txBody>
+      </p:sp>
+      <p:pic>
+        <p:nvPicPr>
+          <p:cNvPr id="2050" name="Picture 2">
+            <a:extLst>
+              <a:ext uri="{FF2B5EF4-FFF2-40B4-BE49-F238E27FC236}">
+                <a16:creationId xmlns:a16="http://schemas.microsoft.com/office/drawing/2014/main" id="{00A4FE67-659A-44B9-A2F9-A88C6BE1E64C}"/>
+              </a:ext>
+            </a:extLst>
+          </p:cNvPr>
+          <p:cNvPicPr>
+            <a:picLocks noChangeAspect="1" noChangeArrowheads="1"/>
+          </p:cNvPicPr>
+          <p:nvPr/>
+        </p:nvPicPr>
+        <p:blipFill>
+          <a:blip r:embed="rId3">
+            <a:extLst>
+              <a:ext uri="{28A0092B-C50C-407E-A947-70E740481C1C}">
+                <a14:useLocalDpi xmlns:a14="http://schemas.microsoft.com/office/drawing/2010/main" val="0"/>
+              </a:ext>
+            </a:extLst>
+          </a:blip>
+          <a:srcRect/>
+          <a:stretch>
+            <a:fillRect/>
+          </a:stretch>
+        </p:blipFill>
+        <p:spPr bwMode="auto">
+          <a:xfrm>
+            <a:off x="5160320" y="1387603"/>
+            <a:ext cx="2571750" cy="2571750"/>
+          </a:xfrm>
+          <a:prstGeom prst="rect">
+            <a:avLst/>
+          </a:prstGeom>
+          <a:noFill/>
+          <a:extLst>
+            <a:ext uri="{909E8E84-426E-40DD-AFC4-6F175D3DCCD1}">
+              <a14:hiddenFill xmlns:a14="http://schemas.microsoft.com/office/drawing/2010/main">
+                <a:solidFill>
+                  <a:srgbClr val="FFFFFF"/>
+                </a:solidFill>
+              </a14:hiddenFill>
+            </a:ext>
+          </a:extLst>
+        </p:spPr>
+      </p:pic>
+    </p:spTree>
+    <p:extLst>
+      <p:ext uri="{BB962C8B-B14F-4D97-AF65-F5344CB8AC3E}">
+        <p14:creationId xmlns:p14="http://schemas.microsoft.com/office/powerpoint/2010/main" val="276292701"/>
       </p:ext>
     </p:extLst>
   </p:cSld>
@@ -2827,13 +3435,8 @@
             <a:pPr lvl="1"/>
             <a:r>
               <a:rPr lang="en-US" dirty="0"/>
-              <a:t>REPL and </a:t>
-            </a:r>
-            <a:r>
-              <a:rPr lang="en-US" dirty="0" err="1"/>
-              <a:t>doctests</a:t>
-            </a:r>
-            <a:endParaRPr lang="en-US" dirty="0"/>
+              <a:t>REPL and documentation as first-class citizen</a:t>
+            </a:r>
           </a:p>
         </p:txBody>
       </p:sp>
@@ -2900,10 +3503,10 @@
       </p:grpSpPr>
       <p:sp>
         <p:nvSpPr>
-          <p:cNvPr id="4" name="Title 3">
+          <p:cNvPr id="2" name="Title 1">
             <a:extLst>
               <a:ext uri="{FF2B5EF4-FFF2-40B4-BE49-F238E27FC236}">
-                <a16:creationId xmlns:a16="http://schemas.microsoft.com/office/drawing/2014/main" id="{0B5E89EB-6726-48BB-A178-4BC22FD7EFD1}"/>
+                <a16:creationId xmlns:a16="http://schemas.microsoft.com/office/drawing/2014/main" id="{6720351E-19A1-4D3F-8458-4295D6E4D024}"/>
               </a:ext>
             </a:extLst>
           </p:cNvPr>
@@ -2914,29 +3517,24 @@
             <p:ph type="title"/>
           </p:nvPr>
         </p:nvSpPr>
-        <p:spPr>
-          <a:xfrm>
-            <a:off x="885440" y="1597396"/>
-            <a:ext cx="4939048" cy="1076082"/>
-          </a:xfrm>
-        </p:spPr>
+        <p:spPr/>
         <p:txBody>
           <a:bodyPr/>
           <a:lstStyle/>
           <a:p>
             <a:r>
               <a:rPr lang="en-US" dirty="0"/>
-              <a:t>Demo</a:t>
+              <a:t>Functional programming</a:t>
             </a:r>
           </a:p>
         </p:txBody>
       </p:sp>
       <p:sp>
         <p:nvSpPr>
-          <p:cNvPr id="5" name="Text Placeholder 4">
+          <p:cNvPr id="3" name="Text Placeholder 2">
             <a:extLst>
               <a:ext uri="{FF2B5EF4-FFF2-40B4-BE49-F238E27FC236}">
-                <a16:creationId xmlns:a16="http://schemas.microsoft.com/office/drawing/2014/main" id="{D92FCB95-0201-4B34-8F73-1B60BBEDA319}"/>
+                <a16:creationId xmlns:a16="http://schemas.microsoft.com/office/drawing/2014/main" id="{0C315960-B113-45DB-865B-E92578845F16}"/>
               </a:ext>
             </a:extLst>
           </p:cNvPr>
@@ -2944,74 +3542,642 @@
             <a:spLocks noGrp="1"/>
           </p:cNvSpPr>
           <p:nvPr>
-            <p:ph type="body" sz="quarter" idx="1"/>
+            <p:ph type="body" idx="1"/>
           </p:nvPr>
         </p:nvSpPr>
-        <p:spPr>
-          <a:xfrm>
-            <a:off x="885440" y="2805606"/>
-            <a:ext cx="5031977" cy="1246787"/>
-          </a:xfrm>
-        </p:spPr>
+        <p:spPr/>
         <p:txBody>
           <a:bodyPr/>
           <a:lstStyle/>
           <a:p>
-            <a:endParaRPr lang="en-US" dirty="0"/>
+            <a:r>
+              <a:rPr lang="en-US" dirty="0"/>
+              <a:t>Focus on actions, not on objects and instances</a:t>
+            </a:r>
           </a:p>
         </p:txBody>
       </p:sp>
       <p:pic>
         <p:nvPicPr>
-          <p:cNvPr id="2050" name="Picture 2">
+          <p:cNvPr id="7" name="Picture 6">
             <a:extLst>
               <a:ext uri="{FF2B5EF4-FFF2-40B4-BE49-F238E27FC236}">
-                <a16:creationId xmlns:a16="http://schemas.microsoft.com/office/drawing/2014/main" id="{00A4FE67-659A-44B9-A2F9-A88C6BE1E64C}"/>
+                <a16:creationId xmlns:a16="http://schemas.microsoft.com/office/drawing/2014/main" id="{786DEEEF-FA56-4A59-B33B-E8633352072A}"/>
               </a:ext>
             </a:extLst>
           </p:cNvPr>
           <p:cNvPicPr>
-            <a:picLocks noChangeAspect="1" noChangeArrowheads="1"/>
+            <a:picLocks noChangeAspect="1"/>
           </p:cNvPicPr>
           <p:nvPr/>
         </p:nvPicPr>
         <p:blipFill>
-          <a:blip r:embed="rId3">
-            <a:extLst>
-              <a:ext uri="{28A0092B-C50C-407E-A947-70E740481C1C}">
-                <a14:useLocalDpi xmlns:a14="http://schemas.microsoft.com/office/drawing/2010/main" val="0"/>
-              </a:ext>
-            </a:extLst>
-          </a:blip>
-          <a:srcRect/>
+          <a:blip r:embed="rId2"/>
           <a:stretch>
             <a:fillRect/>
           </a:stretch>
         </p:blipFill>
-        <p:spPr bwMode="auto">
+        <p:spPr>
           <a:xfrm>
-            <a:off x="5160320" y="1387603"/>
-            <a:ext cx="2571750" cy="2571750"/>
+            <a:off x="6705600" y="2392950"/>
+            <a:ext cx="4648200" cy="2257425"/>
           </a:xfrm>
           <a:prstGeom prst="rect">
             <a:avLst/>
           </a:prstGeom>
-          <a:noFill/>
-          <a:extLst>
-            <a:ext uri="{909E8E84-426E-40DD-AFC4-6F175D3DCCD1}">
-              <a14:hiddenFill xmlns:a14="http://schemas.microsoft.com/office/drawing/2010/main">
-                <a:solidFill>
-                  <a:srgbClr val="FFFFFF"/>
-                </a:solidFill>
-              </a14:hiddenFill>
-            </a:ext>
-          </a:extLst>
+        </p:spPr>
+      </p:pic>
+      <p:pic>
+        <p:nvPicPr>
+          <p:cNvPr id="11" name="Picture 10">
+            <a:extLst>
+              <a:ext uri="{FF2B5EF4-FFF2-40B4-BE49-F238E27FC236}">
+                <a16:creationId xmlns:a16="http://schemas.microsoft.com/office/drawing/2014/main" id="{50E563B6-880C-4DDB-95CF-D7806FD1045F}"/>
+              </a:ext>
+            </a:extLst>
+          </p:cNvPr>
+          <p:cNvPicPr>
+            <a:picLocks noChangeAspect="1"/>
+          </p:cNvPicPr>
+          <p:nvPr/>
+        </p:nvPicPr>
+        <p:blipFill>
+          <a:blip r:embed="rId3"/>
+          <a:stretch>
+            <a:fillRect/>
+          </a:stretch>
+        </p:blipFill>
+        <p:spPr>
+          <a:xfrm>
+            <a:off x="838200" y="1916699"/>
+            <a:ext cx="4648200" cy="3209925"/>
+          </a:xfrm>
+          <a:prstGeom prst="rect">
+            <a:avLst/>
+          </a:prstGeom>
         </p:spPr>
       </p:pic>
     </p:spTree>
     <p:extLst>
       <p:ext uri="{BB962C8B-B14F-4D97-AF65-F5344CB8AC3E}">
-        <p14:creationId xmlns:p14="http://schemas.microsoft.com/office/powerpoint/2010/main" val="2820332712"/>
+        <p14:creationId xmlns:p14="http://schemas.microsoft.com/office/powerpoint/2010/main" val="4046077496"/>
+      </p:ext>
+    </p:extLst>
+  </p:cSld>
+  <p:clrMapOvr>
+    <a:masterClrMapping/>
+  </p:clrMapOvr>
+  <p:transition spd="med"/>
+</p:sld>
+</file>
+
+<file path=ppt/slides/slide6.xml><?xml version="1.0" encoding="utf-8"?>
+<p:sld xmlns:a="http://schemas.openxmlformats.org/drawingml/2006/main" xmlns:r="http://schemas.openxmlformats.org/officeDocument/2006/relationships" xmlns:p="http://schemas.openxmlformats.org/presentationml/2006/main">
+  <p:cSld>
+    <p:spTree>
+      <p:nvGrpSpPr>
+        <p:cNvPr id="1" name=""/>
+        <p:cNvGrpSpPr/>
+        <p:nvPr/>
+      </p:nvGrpSpPr>
+      <p:grpSpPr>
+        <a:xfrm>
+          <a:off x="0" y="0"/>
+          <a:ext cx="0" cy="0"/>
+          <a:chOff x="0" y="0"/>
+          <a:chExt cx="0" cy="0"/>
+        </a:xfrm>
+      </p:grpSpPr>
+      <p:sp>
+        <p:nvSpPr>
+          <p:cNvPr id="2" name="Title 1">
+            <a:extLst>
+              <a:ext uri="{FF2B5EF4-FFF2-40B4-BE49-F238E27FC236}">
+                <a16:creationId xmlns:a16="http://schemas.microsoft.com/office/drawing/2014/main" id="{7AEAB07E-6C92-4221-B972-998B6BB2DEE5}"/>
+              </a:ext>
+            </a:extLst>
+          </p:cNvPr>
+          <p:cNvSpPr>
+            <a:spLocks noGrp="1"/>
+          </p:cNvSpPr>
+          <p:nvPr>
+            <p:ph type="title"/>
+          </p:nvPr>
+        </p:nvSpPr>
+        <p:spPr/>
+        <p:txBody>
+          <a:bodyPr/>
+          <a:lstStyle/>
+          <a:p>
+            <a:r>
+              <a:rPr lang="en-US" dirty="0"/>
+              <a:t>The concept of OOP</a:t>
+            </a:r>
+          </a:p>
+        </p:txBody>
+      </p:sp>
+      <p:sp>
+        <p:nvSpPr>
+          <p:cNvPr id="3" name="Text Placeholder 2">
+            <a:extLst>
+              <a:ext uri="{FF2B5EF4-FFF2-40B4-BE49-F238E27FC236}">
+                <a16:creationId xmlns:a16="http://schemas.microsoft.com/office/drawing/2014/main" id="{0FD3D2F3-ED17-421E-86EB-5C2C24A1E0D5}"/>
+              </a:ext>
+            </a:extLst>
+          </p:cNvPr>
+          <p:cNvSpPr>
+            <a:spLocks noGrp="1"/>
+          </p:cNvSpPr>
+          <p:nvPr>
+            <p:ph type="body" idx="1"/>
+          </p:nvPr>
+        </p:nvSpPr>
+        <p:spPr/>
+        <p:txBody>
+          <a:bodyPr/>
+          <a:lstStyle/>
+          <a:p>
+            <a:r>
+              <a:rPr lang="en-US" dirty="0"/>
+              <a:t>The term is coined by Alan Kay (a biologist) in the 1960s</a:t>
+            </a:r>
+          </a:p>
+          <a:p>
+            <a:endParaRPr lang="en-US" dirty="0"/>
+          </a:p>
+          <a:p>
+            <a:r>
+              <a:rPr lang="en-US" dirty="0"/>
+              <a:t>Simulating the cells in living organisms</a:t>
+            </a:r>
+          </a:p>
+          <a:p>
+            <a:pPr lvl="1"/>
+            <a:r>
+              <a:rPr lang="en-US" dirty="0"/>
+              <a:t>Cells have isolated internal states (data)</a:t>
+            </a:r>
+          </a:p>
+          <a:p>
+            <a:pPr lvl="1"/>
+            <a:r>
+              <a:rPr lang="en-US" dirty="0"/>
+              <a:t>Decoupled from each other</a:t>
+            </a:r>
+          </a:p>
+          <a:p>
+            <a:pPr lvl="1"/>
+            <a:r>
+              <a:rPr lang="en-US" dirty="0"/>
+              <a:t>Communicate through messages</a:t>
+            </a:r>
+          </a:p>
+        </p:txBody>
+      </p:sp>
+    </p:spTree>
+    <p:extLst>
+      <p:ext uri="{BB962C8B-B14F-4D97-AF65-F5344CB8AC3E}">
+        <p14:creationId xmlns:p14="http://schemas.microsoft.com/office/powerpoint/2010/main" val="3757713394"/>
+      </p:ext>
+    </p:extLst>
+  </p:cSld>
+  <p:clrMapOvr>
+    <a:masterClrMapping/>
+  </p:clrMapOvr>
+  <p:transition spd="med"/>
+</p:sld>
+</file>
+
+<file path=ppt/slides/slide7.xml><?xml version="1.0" encoding="utf-8"?>
+<p:sld xmlns:a="http://schemas.openxmlformats.org/drawingml/2006/main" xmlns:r="http://schemas.openxmlformats.org/officeDocument/2006/relationships" xmlns:p="http://schemas.openxmlformats.org/presentationml/2006/main">
+  <p:cSld>
+    <p:spTree>
+      <p:nvGrpSpPr>
+        <p:cNvPr id="1" name=""/>
+        <p:cNvGrpSpPr/>
+        <p:nvPr/>
+      </p:nvGrpSpPr>
+      <p:grpSpPr>
+        <a:xfrm>
+          <a:off x="0" y="0"/>
+          <a:ext cx="0" cy="0"/>
+          <a:chOff x="0" y="0"/>
+          <a:chExt cx="0" cy="0"/>
+        </a:xfrm>
+      </p:grpSpPr>
+      <p:sp>
+        <p:nvSpPr>
+          <p:cNvPr id="2" name="Title 1">
+            <a:extLst>
+              <a:ext uri="{FF2B5EF4-FFF2-40B4-BE49-F238E27FC236}">
+                <a16:creationId xmlns:a16="http://schemas.microsoft.com/office/drawing/2014/main" id="{5C3EA0BA-D389-4116-8171-C89BB0B085D3}"/>
+              </a:ext>
+            </a:extLst>
+          </p:cNvPr>
+          <p:cNvSpPr>
+            <a:spLocks noGrp="1"/>
+          </p:cNvSpPr>
+          <p:nvPr>
+            <p:ph type="title"/>
+          </p:nvPr>
+        </p:nvSpPr>
+        <p:spPr/>
+        <p:txBody>
+          <a:bodyPr/>
+          <a:lstStyle/>
+          <a:p>
+            <a:r>
+              <a:rPr lang="en-US" dirty="0"/>
+              <a:t>Where are the classes?</a:t>
+            </a:r>
+          </a:p>
+        </p:txBody>
+      </p:sp>
+      <p:sp>
+        <p:nvSpPr>
+          <p:cNvPr id="3" name="Text Placeholder 2">
+            <a:extLst>
+              <a:ext uri="{FF2B5EF4-FFF2-40B4-BE49-F238E27FC236}">
+                <a16:creationId xmlns:a16="http://schemas.microsoft.com/office/drawing/2014/main" id="{A29D6443-A7BB-4E10-9E07-ECE255A9D7E2}"/>
+              </a:ext>
+            </a:extLst>
+          </p:cNvPr>
+          <p:cNvSpPr>
+            <a:spLocks noGrp="1"/>
+          </p:cNvSpPr>
+          <p:nvPr>
+            <p:ph type="body" idx="1"/>
+          </p:nvPr>
+        </p:nvSpPr>
+        <p:spPr/>
+        <p:txBody>
+          <a:bodyPr/>
+          <a:lstStyle/>
+          <a:p>
+            <a:r>
+              <a:rPr lang="en-US" dirty="0"/>
+              <a:t>“OOP to me means only messaging, local retention and protection and hiding of state-process, and extreme late-binding of all things.” – Alan Kay</a:t>
+            </a:r>
+          </a:p>
+          <a:p>
+            <a:endParaRPr lang="en-US" dirty="0"/>
+          </a:p>
+          <a:p>
+            <a:r>
+              <a:rPr lang="en-US" dirty="0"/>
+              <a:t>“If I could do Java over again, I would leave out classes.” – James Gosling</a:t>
+            </a:r>
+          </a:p>
+          <a:p>
+            <a:endParaRPr lang="en-US" dirty="0"/>
+          </a:p>
+          <a:p>
+            <a:r>
+              <a:rPr lang="en-US" dirty="0"/>
+              <a:t>It’s about encapsulation and message passing </a:t>
+            </a:r>
+          </a:p>
+          <a:p>
+            <a:pPr marL="0" indent="0">
+              <a:buNone/>
+            </a:pPr>
+            <a:endParaRPr lang="en-US" dirty="0"/>
+          </a:p>
+          <a:p>
+            <a:endParaRPr lang="en-US" dirty="0"/>
+          </a:p>
+        </p:txBody>
+      </p:sp>
+    </p:spTree>
+    <p:extLst>
+      <p:ext uri="{BB962C8B-B14F-4D97-AF65-F5344CB8AC3E}">
+        <p14:creationId xmlns:p14="http://schemas.microsoft.com/office/powerpoint/2010/main" val="3718440161"/>
+      </p:ext>
+    </p:extLst>
+  </p:cSld>
+  <p:clrMapOvr>
+    <a:masterClrMapping/>
+  </p:clrMapOvr>
+  <p:transition spd="med"/>
+</p:sld>
+</file>
+
+<file path=ppt/slides/slide8.xml><?xml version="1.0" encoding="utf-8"?>
+<p:sld xmlns:a="http://schemas.openxmlformats.org/drawingml/2006/main" xmlns:r="http://schemas.openxmlformats.org/officeDocument/2006/relationships" xmlns:p="http://schemas.openxmlformats.org/presentationml/2006/main">
+  <p:cSld>
+    <p:spTree>
+      <p:nvGrpSpPr>
+        <p:cNvPr id="1" name=""/>
+        <p:cNvGrpSpPr/>
+        <p:nvPr/>
+      </p:nvGrpSpPr>
+      <p:grpSpPr>
+        <a:xfrm>
+          <a:off x="0" y="0"/>
+          <a:ext cx="0" cy="0"/>
+          <a:chOff x="0" y="0"/>
+          <a:chExt cx="0" cy="0"/>
+        </a:xfrm>
+      </p:grpSpPr>
+      <p:sp>
+        <p:nvSpPr>
+          <p:cNvPr id="2" name="Title 1">
+            <a:extLst>
+              <a:ext uri="{FF2B5EF4-FFF2-40B4-BE49-F238E27FC236}">
+                <a16:creationId xmlns:a16="http://schemas.microsoft.com/office/drawing/2014/main" id="{9B1BBCE2-8B54-499C-9031-3DC9FCB28EDD}"/>
+              </a:ext>
+            </a:extLst>
+          </p:cNvPr>
+          <p:cNvSpPr>
+            <a:spLocks noGrp="1"/>
+          </p:cNvSpPr>
+          <p:nvPr>
+            <p:ph type="title"/>
+          </p:nvPr>
+        </p:nvSpPr>
+        <p:spPr/>
+        <p:txBody>
+          <a:bodyPr/>
+          <a:lstStyle/>
+          <a:p>
+            <a:r>
+              <a:rPr lang="en-US" dirty="0"/>
+              <a:t>Let’s talk about encapsulation</a:t>
+            </a:r>
+          </a:p>
+        </p:txBody>
+      </p:sp>
+      <p:sp>
+        <p:nvSpPr>
+          <p:cNvPr id="3" name="Text Placeholder 2">
+            <a:extLst>
+              <a:ext uri="{FF2B5EF4-FFF2-40B4-BE49-F238E27FC236}">
+                <a16:creationId xmlns:a16="http://schemas.microsoft.com/office/drawing/2014/main" id="{6CAF0DF2-924D-4E08-8116-D0486DEEFF2D}"/>
+              </a:ext>
+            </a:extLst>
+          </p:cNvPr>
+          <p:cNvSpPr>
+            <a:spLocks noGrp="1"/>
+          </p:cNvSpPr>
+          <p:nvPr>
+            <p:ph type="body" idx="1"/>
+          </p:nvPr>
+        </p:nvSpPr>
+        <p:spPr/>
+        <p:txBody>
+          <a:bodyPr/>
+          <a:lstStyle/>
+          <a:p>
+            <a:endParaRPr lang="en-US" dirty="0"/>
+          </a:p>
+          <a:p>
+            <a:endParaRPr lang="en-US" dirty="0"/>
+          </a:p>
+          <a:p>
+            <a:endParaRPr lang="en-US" dirty="0"/>
+          </a:p>
+          <a:p>
+            <a:endParaRPr lang="en-US" dirty="0"/>
+          </a:p>
+          <a:p>
+            <a:endParaRPr lang="en-US" dirty="0"/>
+          </a:p>
+          <a:p>
+            <a:endParaRPr lang="en-US" dirty="0"/>
+          </a:p>
+          <a:p>
+            <a:endParaRPr lang="en-US" dirty="0"/>
+          </a:p>
+          <a:p>
+            <a:endParaRPr lang="en-US" dirty="0"/>
+          </a:p>
+          <a:p>
+            <a:r>
+              <a:rPr lang="en-US" dirty="0"/>
+              <a:t>What’s the difference?</a:t>
+            </a:r>
+          </a:p>
+        </p:txBody>
+      </p:sp>
+      <p:pic>
+        <p:nvPicPr>
+          <p:cNvPr id="9" name="Picture 8">
+            <a:extLst>
+              <a:ext uri="{FF2B5EF4-FFF2-40B4-BE49-F238E27FC236}">
+                <a16:creationId xmlns:a16="http://schemas.microsoft.com/office/drawing/2014/main" id="{D59C6852-FFDB-40E9-9482-1A665E890E0F}"/>
+              </a:ext>
+            </a:extLst>
+          </p:cNvPr>
+          <p:cNvPicPr>
+            <a:picLocks noChangeAspect="1"/>
+          </p:cNvPicPr>
+          <p:nvPr/>
+        </p:nvPicPr>
+        <p:blipFill>
+          <a:blip r:embed="rId2"/>
+          <a:stretch>
+            <a:fillRect/>
+          </a:stretch>
+        </p:blipFill>
+        <p:spPr>
+          <a:xfrm>
+            <a:off x="6705600" y="1345994"/>
+            <a:ext cx="4648200" cy="3019425"/>
+          </a:xfrm>
+          <a:prstGeom prst="rect">
+            <a:avLst/>
+          </a:prstGeom>
+        </p:spPr>
+      </p:pic>
+      <p:pic>
+        <p:nvPicPr>
+          <p:cNvPr id="11" name="Picture 10">
+            <a:extLst>
+              <a:ext uri="{FF2B5EF4-FFF2-40B4-BE49-F238E27FC236}">
+                <a16:creationId xmlns:a16="http://schemas.microsoft.com/office/drawing/2014/main" id="{C1C7FF18-D6BB-4252-916D-14C0F201CDE2}"/>
+              </a:ext>
+            </a:extLst>
+          </p:cNvPr>
+          <p:cNvPicPr>
+            <a:picLocks noChangeAspect="1"/>
+          </p:cNvPicPr>
+          <p:nvPr/>
+        </p:nvPicPr>
+        <p:blipFill>
+          <a:blip r:embed="rId3"/>
+          <a:stretch>
+            <a:fillRect/>
+          </a:stretch>
+        </p:blipFill>
+        <p:spPr>
+          <a:xfrm>
+            <a:off x="838196" y="1345995"/>
+            <a:ext cx="4648200" cy="3019425"/>
+          </a:xfrm>
+          <a:prstGeom prst="rect">
+            <a:avLst/>
+          </a:prstGeom>
+        </p:spPr>
+      </p:pic>
+    </p:spTree>
+    <p:extLst>
+      <p:ext uri="{BB962C8B-B14F-4D97-AF65-F5344CB8AC3E}">
+        <p14:creationId xmlns:p14="http://schemas.microsoft.com/office/powerpoint/2010/main" val="3142132358"/>
+      </p:ext>
+    </p:extLst>
+  </p:cSld>
+  <p:clrMapOvr>
+    <a:masterClrMapping/>
+  </p:clrMapOvr>
+  <p:transition spd="med"/>
+</p:sld>
+</file>
+
+<file path=ppt/slides/slide9.xml><?xml version="1.0" encoding="utf-8"?>
+<p:sld xmlns:a="http://schemas.openxmlformats.org/drawingml/2006/main" xmlns:r="http://schemas.openxmlformats.org/officeDocument/2006/relationships" xmlns:p="http://schemas.openxmlformats.org/presentationml/2006/main">
+  <p:cSld>
+    <p:spTree>
+      <p:nvGrpSpPr>
+        <p:cNvPr id="1" name=""/>
+        <p:cNvGrpSpPr/>
+        <p:nvPr/>
+      </p:nvGrpSpPr>
+      <p:grpSpPr>
+        <a:xfrm>
+          <a:off x="0" y="0"/>
+          <a:ext cx="0" cy="0"/>
+          <a:chOff x="0" y="0"/>
+          <a:chExt cx="0" cy="0"/>
+        </a:xfrm>
+      </p:grpSpPr>
+      <p:sp>
+        <p:nvSpPr>
+          <p:cNvPr id="2" name="Title 1">
+            <a:extLst>
+              <a:ext uri="{FF2B5EF4-FFF2-40B4-BE49-F238E27FC236}">
+                <a16:creationId xmlns:a16="http://schemas.microsoft.com/office/drawing/2014/main" id="{8323C7E2-E618-4878-9F4C-36481B82DCF4}"/>
+              </a:ext>
+            </a:extLst>
+          </p:cNvPr>
+          <p:cNvSpPr>
+            <a:spLocks noGrp="1"/>
+          </p:cNvSpPr>
+          <p:nvPr>
+            <p:ph type="title"/>
+          </p:nvPr>
+        </p:nvSpPr>
+        <p:spPr/>
+        <p:txBody>
+          <a:bodyPr/>
+          <a:lstStyle/>
+          <a:p>
+            <a:r>
+              <a:rPr lang="en-US" dirty="0"/>
+              <a:t>The real encapsulation</a:t>
+            </a:r>
+          </a:p>
+        </p:txBody>
+      </p:sp>
+      <p:sp>
+        <p:nvSpPr>
+          <p:cNvPr id="3" name="Text Placeholder 2">
+            <a:extLst>
+              <a:ext uri="{FF2B5EF4-FFF2-40B4-BE49-F238E27FC236}">
+                <a16:creationId xmlns:a16="http://schemas.microsoft.com/office/drawing/2014/main" id="{8B174CAE-CD68-4EC4-A539-88AB0E62D178}"/>
+              </a:ext>
+            </a:extLst>
+          </p:cNvPr>
+          <p:cNvSpPr>
+            <a:spLocks noGrp="1"/>
+          </p:cNvSpPr>
+          <p:nvPr>
+            <p:ph type="body" idx="1"/>
+          </p:nvPr>
+        </p:nvSpPr>
+        <p:spPr/>
+        <p:txBody>
+          <a:bodyPr/>
+          <a:lstStyle/>
+          <a:p>
+            <a:r>
+              <a:rPr lang="en-US" dirty="0"/>
+              <a:t>Avoiding shared mutable state </a:t>
+            </a:r>
+          </a:p>
+          <a:p>
+            <a:pPr lvl="1"/>
+            <a:r>
+              <a:rPr lang="en-US" dirty="0"/>
+              <a:t>Reduce side effects</a:t>
+            </a:r>
+          </a:p>
+          <a:p>
+            <a:pPr lvl="1"/>
+            <a:r>
+              <a:rPr lang="en-US" dirty="0"/>
+              <a:t>Less bugs</a:t>
+            </a:r>
+          </a:p>
+          <a:p>
+            <a:pPr lvl="1"/>
+            <a:r>
+              <a:rPr lang="en-US" dirty="0"/>
+              <a:t>Forget about getters and setters</a:t>
+            </a:r>
+          </a:p>
+          <a:p>
+            <a:pPr lvl="1"/>
+            <a:endParaRPr lang="en-US" dirty="0"/>
+          </a:p>
+          <a:p>
+            <a:r>
+              <a:rPr lang="en-US" dirty="0"/>
+              <a:t>In Elixir, everything is immutable!</a:t>
+            </a:r>
+          </a:p>
+          <a:p>
+            <a:pPr lvl="1"/>
+            <a:r>
+              <a:rPr lang="en-US" dirty="0"/>
+              <a:t>Records in Java/C# are step in the right direction</a:t>
+            </a:r>
+          </a:p>
+        </p:txBody>
+      </p:sp>
+      <p:pic>
+        <p:nvPicPr>
+          <p:cNvPr id="7" name="Picture 6">
+            <a:extLst>
+              <a:ext uri="{FF2B5EF4-FFF2-40B4-BE49-F238E27FC236}">
+                <a16:creationId xmlns:a16="http://schemas.microsoft.com/office/drawing/2014/main" id="{C3D9CB00-B604-4964-80B8-6EE3E302B9A0}"/>
+              </a:ext>
+            </a:extLst>
+          </p:cNvPr>
+          <p:cNvPicPr>
+            <a:picLocks noChangeAspect="1"/>
+          </p:cNvPicPr>
+          <p:nvPr/>
+        </p:nvPicPr>
+        <p:blipFill>
+          <a:blip r:embed="rId2"/>
+          <a:stretch>
+            <a:fillRect/>
+          </a:stretch>
+        </p:blipFill>
+        <p:spPr>
+          <a:xfrm>
+            <a:off x="6705600" y="1958391"/>
+            <a:ext cx="4648200" cy="1685925"/>
+          </a:xfrm>
+          <a:prstGeom prst="rect">
+            <a:avLst/>
+          </a:prstGeom>
+        </p:spPr>
+      </p:pic>
+    </p:spTree>
+    <p:extLst>
+      <p:ext uri="{BB962C8B-B14F-4D97-AF65-F5344CB8AC3E}">
+        <p14:creationId xmlns:p14="http://schemas.microsoft.com/office/powerpoint/2010/main" val="3262837871"/>
       </p:ext>
     </p:extLst>
   </p:cSld>
@@ -5372,18 +6538,18 @@
 </file>
 
 <file path=customXml/item2.xml><?xml version="1.0" encoding="utf-8"?>
+<p:properties xmlns:p="http://schemas.microsoft.com/office/2006/metadata/properties" xmlns:xsi="http://www.w3.org/2001/XMLSchema-instance" xmlns:pc="http://schemas.microsoft.com/office/infopath/2007/PartnerControls">
+  <documentManagement/>
+</p:properties>
+</file>
+
+<file path=customXml/item3.xml><?xml version="1.0" encoding="utf-8"?>
 <?mso-contentType ?>
 <FormTemplates xmlns="http://schemas.microsoft.com/sharepoint/v3/contenttype/forms">
   <Display>DocumentLibraryForm</Display>
   <Edit>DocumentLibraryForm</Edit>
   <New>DocumentLibraryForm</New>
 </FormTemplates>
-</file>
-
-<file path=customXml/item3.xml><?xml version="1.0" encoding="utf-8"?>
-<p:properties xmlns:p="http://schemas.microsoft.com/office/2006/metadata/properties" xmlns:xsi="http://www.w3.org/2001/XMLSchema-instance" xmlns:pc="http://schemas.microsoft.com/office/infopath/2007/PartnerControls">
-  <documentManagement/>
-</p:properties>
 </file>
 
 <file path=customXml/itemProps1.xml><?xml version="1.0" encoding="utf-8"?>
@@ -5406,18 +6572,18 @@
 </file>
 
 <file path=customXml/itemProps2.xml><?xml version="1.0" encoding="utf-8"?>
-<ds:datastoreItem xmlns:ds="http://schemas.openxmlformats.org/officeDocument/2006/customXml" ds:itemID="{450D9D61-AB1C-42DB-97B3-F16948BBEDA5}">
-  <ds:schemaRefs>
-    <ds:schemaRef ds:uri="http://schemas.microsoft.com/sharepoint/v3/contenttype/forms"/>
-  </ds:schemaRefs>
-</ds:datastoreItem>
-</file>
-
-<file path=customXml/itemProps3.xml><?xml version="1.0" encoding="utf-8"?>
 <ds:datastoreItem xmlns:ds="http://schemas.openxmlformats.org/officeDocument/2006/customXml" ds:itemID="{28013F97-F744-428B-8504-911AB7D87FBC}">
   <ds:schemaRefs>
     <ds:schemaRef ds:uri="http://schemas.microsoft.com/office/2006/metadata/properties"/>
     <ds:schemaRef ds:uri="http://schemas.microsoft.com/office/infopath/2007/PartnerControls"/>
   </ds:schemaRefs>
 </ds:datastoreItem>
+</file>
+
+<file path=customXml/itemProps3.xml><?xml version="1.0" encoding="utf-8"?>
+<ds:datastoreItem xmlns:ds="http://schemas.openxmlformats.org/officeDocument/2006/customXml" ds:itemID="{450D9D61-AB1C-42DB-97B3-F16948BBEDA5}">
+  <ds:schemaRefs>
+    <ds:schemaRef ds:uri="http://schemas.microsoft.com/sharepoint/v3/contenttype/forms"/>
+  </ds:schemaRefs>
+</ds:datastoreItem>
 </file>
</xml_diff>

<commit_message>
Started describing the BEAM concurrency model
</commit_message>
<xml_diff>
--- a/Elixir Tech Talk.pptx
+++ b/Elixir Tech Talk.pptx
@@ -5,7 +5,7 @@
     <p:sldMasterId id="2147483648" r:id="rId4"/>
   </p:sldMasterIdLst>
   <p:notesMasterIdLst>
-    <p:notesMasterId r:id="rId18"/>
+    <p:notesMasterId r:id="rId19"/>
   </p:notesMasterIdLst>
   <p:sldIdLst>
     <p:sldId id="258" r:id="rId5"/>
@@ -21,6 +21,7 @@
     <p:sldId id="272" r:id="rId15"/>
     <p:sldId id="281" r:id="rId16"/>
     <p:sldId id="282" r:id="rId17"/>
+    <p:sldId id="283" r:id="rId18"/>
   </p:sldIdLst>
   <p:sldSz cx="12192000" cy="6858000"/>
   <p:notesSz cx="6858000" cy="9144000"/>
@@ -811,7 +812,7 @@
           </a:ln>
           <a:extLst>
             <a:ext uri="{C572A759-6A51-4108-AA02-DFA0A04FC94B}">
-              <ma14:wrappingTextBoxFlag xmlns="" xmlns:m="http://schemas.openxmlformats.org/officeDocument/2006/math" xmlns:a14="http://schemas.microsoft.com/office/drawing/2010/main" xmlns:ma14="http://schemas.microsoft.com/office/mac/drawingml/2011/main" val="1"/>
+              <ma14:wrappingTextBoxFlag xmlns:ma14="http://schemas.microsoft.com/office/mac/drawingml/2011/main" xmlns:a14="http://schemas.microsoft.com/office/drawing/2010/main" xmlns:m="http://schemas.openxmlformats.org/officeDocument/2006/math" xmlns="" val="1"/>
             </a:ext>
           </a:extLst>
         </p:spPr>
@@ -1079,7 +1080,7 @@
           </a:ln>
           <a:extLst>
             <a:ext uri="{C572A759-6A51-4108-AA02-DFA0A04FC94B}">
-              <ma14:wrappingTextBoxFlag xmlns="" xmlns:m="http://schemas.openxmlformats.org/officeDocument/2006/math" xmlns:a14="http://schemas.microsoft.com/office/drawing/2010/main" xmlns:ma14="http://schemas.microsoft.com/office/mac/drawingml/2011/main" val="1"/>
+              <ma14:wrappingTextBoxFlag xmlns:ma14="http://schemas.microsoft.com/office/mac/drawingml/2011/main" xmlns:a14="http://schemas.microsoft.com/office/drawing/2010/main" xmlns:m="http://schemas.openxmlformats.org/officeDocument/2006/math" xmlns="" val="1"/>
             </a:ext>
           </a:extLst>
         </p:spPr>
@@ -1338,7 +1339,7 @@
           </a:ln>
           <a:extLst>
             <a:ext uri="{C572A759-6A51-4108-AA02-DFA0A04FC94B}">
-              <ma14:wrappingTextBoxFlag xmlns="" xmlns:m="http://schemas.openxmlformats.org/officeDocument/2006/math" xmlns:a14="http://schemas.microsoft.com/office/drawing/2010/main" xmlns:ma14="http://schemas.microsoft.com/office/mac/drawingml/2011/main" val="1"/>
+              <ma14:wrappingTextBoxFlag xmlns:ma14="http://schemas.microsoft.com/office/mac/drawingml/2011/main" xmlns:a14="http://schemas.microsoft.com/office/drawing/2010/main" xmlns:m="http://schemas.openxmlformats.org/officeDocument/2006/math" xmlns="" val="1"/>
             </a:ext>
           </a:extLst>
         </p:spPr>
@@ -1377,7 +1378,7 @@
           </a:ln>
           <a:extLst>
             <a:ext uri="{C572A759-6A51-4108-AA02-DFA0A04FC94B}">
-              <ma14:wrappingTextBoxFlag xmlns="" xmlns:m="http://schemas.openxmlformats.org/officeDocument/2006/math" xmlns:a14="http://schemas.microsoft.com/office/drawing/2010/main" xmlns:ma14="http://schemas.microsoft.com/office/mac/drawingml/2011/main" val="1"/>
+              <ma14:wrappingTextBoxFlag xmlns:ma14="http://schemas.microsoft.com/office/mac/drawingml/2011/main" xmlns:a14="http://schemas.microsoft.com/office/drawing/2010/main" xmlns:m="http://schemas.openxmlformats.org/officeDocument/2006/math" xmlns="" val="1"/>
             </a:ext>
           </a:extLst>
         </p:spPr>
@@ -1469,7 +1470,7 @@
           </a:ln>
           <a:extLst>
             <a:ext uri="{C572A759-6A51-4108-AA02-DFA0A04FC94B}">
-              <ma14:wrappingTextBoxFlag xmlns="" xmlns:m="http://schemas.openxmlformats.org/officeDocument/2006/math" xmlns:a14="http://schemas.microsoft.com/office/drawing/2010/main" xmlns:ma14="http://schemas.microsoft.com/office/mac/drawingml/2011/main" val="1"/>
+              <ma14:wrappingTextBoxFlag xmlns:ma14="http://schemas.microsoft.com/office/mac/drawingml/2011/main" xmlns:a14="http://schemas.microsoft.com/office/drawing/2010/main" xmlns:m="http://schemas.openxmlformats.org/officeDocument/2006/math" xmlns="" val="1"/>
             </a:ext>
           </a:extLst>
         </p:spPr>
@@ -3012,6 +3013,141 @@
 </p:sld>
 </file>
 
+<file path=ppt/slides/slide14.xml><?xml version="1.0" encoding="utf-8"?>
+<p:sld xmlns:a="http://schemas.openxmlformats.org/drawingml/2006/main" xmlns:r="http://schemas.openxmlformats.org/officeDocument/2006/relationships" xmlns:p="http://schemas.openxmlformats.org/presentationml/2006/main">
+  <p:cSld>
+    <p:spTree>
+      <p:nvGrpSpPr>
+        <p:cNvPr id="1" name=""/>
+        <p:cNvGrpSpPr/>
+        <p:nvPr/>
+      </p:nvGrpSpPr>
+      <p:grpSpPr>
+        <a:xfrm>
+          <a:off x="0" y="0"/>
+          <a:ext cx="0" cy="0"/>
+          <a:chOff x="0" y="0"/>
+          <a:chExt cx="0" cy="0"/>
+        </a:xfrm>
+      </p:grpSpPr>
+      <p:sp>
+        <p:nvSpPr>
+          <p:cNvPr id="2" name="Title 1">
+            <a:extLst>
+              <a:ext uri="{FF2B5EF4-FFF2-40B4-BE49-F238E27FC236}">
+                <a16:creationId xmlns:a16="http://schemas.microsoft.com/office/drawing/2014/main" id="{DF0FD63B-0CCD-4FCA-BF96-BA8845AFDE2D}"/>
+              </a:ext>
+            </a:extLst>
+          </p:cNvPr>
+          <p:cNvSpPr>
+            <a:spLocks noGrp="1"/>
+          </p:cNvSpPr>
+          <p:nvPr>
+            <p:ph type="title"/>
+          </p:nvPr>
+        </p:nvSpPr>
+        <p:spPr/>
+        <p:txBody>
+          <a:bodyPr/>
+          <a:lstStyle/>
+          <a:p>
+            <a:r>
+              <a:rPr lang="en-US" dirty="0"/>
+              <a:t>BEAM concurrency model</a:t>
+            </a:r>
+          </a:p>
+        </p:txBody>
+      </p:sp>
+      <p:sp>
+        <p:nvSpPr>
+          <p:cNvPr id="3" name="Text Placeholder 2">
+            <a:extLst>
+              <a:ext uri="{FF2B5EF4-FFF2-40B4-BE49-F238E27FC236}">
+                <a16:creationId xmlns:a16="http://schemas.microsoft.com/office/drawing/2014/main" id="{8C06FB00-AE79-4C8E-A13D-F1BE2838116C}"/>
+              </a:ext>
+            </a:extLst>
+          </p:cNvPr>
+          <p:cNvSpPr>
+            <a:spLocks noGrp="1"/>
+          </p:cNvSpPr>
+          <p:nvPr>
+            <p:ph type="body" idx="1"/>
+          </p:nvPr>
+        </p:nvSpPr>
+        <p:spPr/>
+        <p:txBody>
+          <a:bodyPr/>
+          <a:lstStyle/>
+          <a:p>
+            <a:r>
+              <a:rPr lang="en-US" dirty="0"/>
+              <a:t>BEAM VM has its own scheduler</a:t>
+            </a:r>
+          </a:p>
+          <a:p>
+            <a:pPr lvl="1"/>
+            <a:r>
+              <a:rPr lang="en-US" dirty="0"/>
+              <a:t>Runs lightweight processes instead of OS threads</a:t>
+            </a:r>
+          </a:p>
+          <a:p>
+            <a:pPr lvl="1"/>
+            <a:r>
+              <a:rPr lang="en-US" dirty="0"/>
+              <a:t>No shared state between processes</a:t>
+            </a:r>
+          </a:p>
+          <a:p>
+            <a:pPr lvl="1"/>
+            <a:r>
+              <a:rPr lang="en-US" dirty="0"/>
+              <a:t>Communication is done via message passing</a:t>
+            </a:r>
+          </a:p>
+          <a:p>
+            <a:r>
+              <a:rPr lang="en-US" dirty="0"/>
+              <a:t>Isolation means:</a:t>
+            </a:r>
+          </a:p>
+          <a:p>
+            <a:pPr lvl="1"/>
+            <a:r>
+              <a:rPr lang="en-US" dirty="0"/>
+              <a:t>Better performance (no locks)</a:t>
+            </a:r>
+          </a:p>
+          <a:p>
+            <a:pPr lvl="1"/>
+            <a:r>
+              <a:rPr lang="en-US" dirty="0"/>
+              <a:t>Fault tolerance</a:t>
+            </a:r>
+          </a:p>
+          <a:p>
+            <a:pPr lvl="1"/>
+            <a:r>
+              <a:rPr lang="en-US" dirty="0"/>
+              <a:t>Scalability – up to ~268M running processes</a:t>
+            </a:r>
+          </a:p>
+        </p:txBody>
+      </p:sp>
+    </p:spTree>
+    <p:extLst>
+      <p:ext uri="{BB962C8B-B14F-4D97-AF65-F5344CB8AC3E}">
+        <p14:creationId xmlns:p14="http://schemas.microsoft.com/office/powerpoint/2010/main" val="3034593965"/>
+      </p:ext>
+    </p:extLst>
+  </p:cSld>
+  <p:clrMapOvr>
+    <a:masterClrMapping/>
+  </p:clrMapOvr>
+  <p:transition spd="med"/>
+</p:sld>
+</file>
+
 <file path=ppt/slides/slide2.xml><?xml version="1.0" encoding="utf-8"?>
 <p:sld xmlns:a="http://schemas.openxmlformats.org/drawingml/2006/main" xmlns:r="http://schemas.openxmlformats.org/officeDocument/2006/relationships" xmlns:p="http://schemas.openxmlformats.org/presentationml/2006/main">
   <p:cSld>
@@ -6335,6 +6471,12 @@
 </file>
 
 <file path=customXml/item1.xml><?xml version="1.0" encoding="utf-8"?>
+<p:properties xmlns:p="http://schemas.microsoft.com/office/2006/metadata/properties" xmlns:xsi="http://www.w3.org/2001/XMLSchema-instance" xmlns:pc="http://schemas.microsoft.com/office/infopath/2007/PartnerControls">
+  <documentManagement/>
+</p:properties>
+</file>
+
+<file path=customXml/item2.xml><?xml version="1.0" encoding="utf-8"?>
 <ct:contentTypeSchema xmlns:ct="http://schemas.microsoft.com/office/2006/metadata/contentType" xmlns:ma="http://schemas.microsoft.com/office/2006/metadata/properties/metaAttributes" ct:_="" ma:_="" ma:contentTypeName="Document" ma:contentTypeID="0x0101004FE2915043E30E43AE6BD266BA7C260E" ma:contentTypeVersion="10" ma:contentTypeDescription="Create a new document." ma:contentTypeScope="" ma:versionID="2be7ab3cc8b59e7568c8f4ab777f1af6">
   <xsd:schema xmlns:xsd="http://www.w3.org/2001/XMLSchema" xmlns:xs="http://www.w3.org/2001/XMLSchema" xmlns:p="http://schemas.microsoft.com/office/2006/metadata/properties" xmlns:ns2="e4ee0c53-2d94-43da-a56a-ee2266385724" xmlns:ns3="649eb69c-f108-4a9e-8f42-09f1f02c87f5" targetNamespace="http://schemas.microsoft.com/office/2006/metadata/properties" ma:root="true" ma:fieldsID="65b55a7f7c772a96aad2501ed6708a0d" ns2:_="" ns3:_="">
     <xsd:import namespace="e4ee0c53-2d94-43da-a56a-ee2266385724"/>
@@ -6537,12 +6679,6 @@
 </ct:contentTypeSchema>
 </file>
 
-<file path=customXml/item2.xml><?xml version="1.0" encoding="utf-8"?>
-<p:properties xmlns:p="http://schemas.microsoft.com/office/2006/metadata/properties" xmlns:xsi="http://www.w3.org/2001/XMLSchema-instance" xmlns:pc="http://schemas.microsoft.com/office/infopath/2007/PartnerControls">
-  <documentManagement/>
-</p:properties>
-</file>
-
 <file path=customXml/item3.xml><?xml version="1.0" encoding="utf-8"?>
 <?mso-contentType ?>
 <FormTemplates xmlns="http://schemas.microsoft.com/sharepoint/v3/contenttype/forms">
@@ -6553,6 +6689,15 @@
 </file>
 
 <file path=customXml/itemProps1.xml><?xml version="1.0" encoding="utf-8"?>
+<ds:datastoreItem xmlns:ds="http://schemas.openxmlformats.org/officeDocument/2006/customXml" ds:itemID="{28013F97-F744-428B-8504-911AB7D87FBC}">
+  <ds:schemaRefs>
+    <ds:schemaRef ds:uri="http://schemas.microsoft.com/office/2006/metadata/properties"/>
+    <ds:schemaRef ds:uri="http://schemas.microsoft.com/office/infopath/2007/PartnerControls"/>
+  </ds:schemaRefs>
+</ds:datastoreItem>
+</file>
+
+<file path=customXml/itemProps2.xml><?xml version="1.0" encoding="utf-8"?>
 <ds:datastoreItem xmlns:ds="http://schemas.openxmlformats.org/officeDocument/2006/customXml" ds:itemID="{7BCD7B8E-9E4C-43E9-8D0A-A2FE873E7128}">
   <ds:schemaRefs>
     <ds:schemaRef ds:uri="http://schemas.microsoft.com/office/2006/metadata/contentType"/>
@@ -6571,15 +6716,6 @@
 </ds:datastoreItem>
 </file>
 
-<file path=customXml/itemProps2.xml><?xml version="1.0" encoding="utf-8"?>
-<ds:datastoreItem xmlns:ds="http://schemas.openxmlformats.org/officeDocument/2006/customXml" ds:itemID="{28013F97-F744-428B-8504-911AB7D87FBC}">
-  <ds:schemaRefs>
-    <ds:schemaRef ds:uri="http://schemas.microsoft.com/office/2006/metadata/properties"/>
-    <ds:schemaRef ds:uri="http://schemas.microsoft.com/office/infopath/2007/PartnerControls"/>
-  </ds:schemaRefs>
-</ds:datastoreItem>
-</file>
-
 <file path=customXml/itemProps3.xml><?xml version="1.0" encoding="utf-8"?>
 <ds:datastoreItem xmlns:ds="http://schemas.openxmlformats.org/officeDocument/2006/customXml" ds:itemID="{450D9D61-AB1C-42DB-97B3-F16948BBEDA5}">
   <ds:schemaRefs>

</xml_diff>

<commit_message>
Separated concurrency model slides
</commit_message>
<xml_diff>
--- a/Elixir Tech Talk.pptx
+++ b/Elixir Tech Talk.pptx
@@ -5,7 +5,7 @@
     <p:sldMasterId id="2147483648" r:id="rId4"/>
   </p:sldMasterIdLst>
   <p:notesMasterIdLst>
-    <p:notesMasterId r:id="rId19"/>
+    <p:notesMasterId r:id="rId20"/>
   </p:notesMasterIdLst>
   <p:sldIdLst>
     <p:sldId id="258" r:id="rId5"/>
@@ -22,6 +22,7 @@
     <p:sldId id="281" r:id="rId16"/>
     <p:sldId id="282" r:id="rId17"/>
     <p:sldId id="283" r:id="rId18"/>
+    <p:sldId id="284" r:id="rId19"/>
   </p:sldIdLst>
   <p:sldSz cx="12192000" cy="6858000"/>
   <p:notesSz cx="6858000" cy="9144000"/>
@@ -812,7 +813,7 @@
           </a:ln>
           <a:extLst>
             <a:ext uri="{C572A759-6A51-4108-AA02-DFA0A04FC94B}">
-              <ma14:wrappingTextBoxFlag xmlns:ma14="http://schemas.microsoft.com/office/mac/drawingml/2011/main" xmlns:a14="http://schemas.microsoft.com/office/drawing/2010/main" xmlns:m="http://schemas.openxmlformats.org/officeDocument/2006/math" xmlns="" val="1"/>
+              <ma14:wrappingTextBoxFlag xmlns="" xmlns:m="http://schemas.openxmlformats.org/officeDocument/2006/math" xmlns:a14="http://schemas.microsoft.com/office/drawing/2010/main" xmlns:ma14="http://schemas.microsoft.com/office/mac/drawingml/2011/main" val="1"/>
             </a:ext>
           </a:extLst>
         </p:spPr>
@@ -1080,7 +1081,7 @@
           </a:ln>
           <a:extLst>
             <a:ext uri="{C572A759-6A51-4108-AA02-DFA0A04FC94B}">
-              <ma14:wrappingTextBoxFlag xmlns:ma14="http://schemas.microsoft.com/office/mac/drawingml/2011/main" xmlns:a14="http://schemas.microsoft.com/office/drawing/2010/main" xmlns:m="http://schemas.openxmlformats.org/officeDocument/2006/math" xmlns="" val="1"/>
+              <ma14:wrappingTextBoxFlag xmlns="" xmlns:m="http://schemas.openxmlformats.org/officeDocument/2006/math" xmlns:a14="http://schemas.microsoft.com/office/drawing/2010/main" xmlns:ma14="http://schemas.microsoft.com/office/mac/drawingml/2011/main" val="1"/>
             </a:ext>
           </a:extLst>
         </p:spPr>
@@ -1339,7 +1340,7 @@
           </a:ln>
           <a:extLst>
             <a:ext uri="{C572A759-6A51-4108-AA02-DFA0A04FC94B}">
-              <ma14:wrappingTextBoxFlag xmlns:ma14="http://schemas.microsoft.com/office/mac/drawingml/2011/main" xmlns:a14="http://schemas.microsoft.com/office/drawing/2010/main" xmlns:m="http://schemas.openxmlformats.org/officeDocument/2006/math" xmlns="" val="1"/>
+              <ma14:wrappingTextBoxFlag xmlns="" xmlns:m="http://schemas.openxmlformats.org/officeDocument/2006/math" xmlns:a14="http://schemas.microsoft.com/office/drawing/2010/main" xmlns:ma14="http://schemas.microsoft.com/office/mac/drawingml/2011/main" val="1"/>
             </a:ext>
           </a:extLst>
         </p:spPr>
@@ -1378,7 +1379,7 @@
           </a:ln>
           <a:extLst>
             <a:ext uri="{C572A759-6A51-4108-AA02-DFA0A04FC94B}">
-              <ma14:wrappingTextBoxFlag xmlns:ma14="http://schemas.microsoft.com/office/mac/drawingml/2011/main" xmlns:a14="http://schemas.microsoft.com/office/drawing/2010/main" xmlns:m="http://schemas.openxmlformats.org/officeDocument/2006/math" xmlns="" val="1"/>
+              <ma14:wrappingTextBoxFlag xmlns="" xmlns:m="http://schemas.openxmlformats.org/officeDocument/2006/math" xmlns:a14="http://schemas.microsoft.com/office/drawing/2010/main" xmlns:ma14="http://schemas.microsoft.com/office/mac/drawingml/2011/main" val="1"/>
             </a:ext>
           </a:extLst>
         </p:spPr>
@@ -1470,7 +1471,7 @@
           </a:ln>
           <a:extLst>
             <a:ext uri="{C572A759-6A51-4108-AA02-DFA0A04FC94B}">
-              <ma14:wrappingTextBoxFlag xmlns:ma14="http://schemas.microsoft.com/office/mac/drawingml/2011/main" xmlns:a14="http://schemas.microsoft.com/office/drawing/2010/main" xmlns:m="http://schemas.openxmlformats.org/officeDocument/2006/math" xmlns="" val="1"/>
+              <ma14:wrappingTextBoxFlag xmlns="" xmlns:m="http://schemas.openxmlformats.org/officeDocument/2006/math" xmlns:a14="http://schemas.microsoft.com/office/drawing/2010/main" xmlns:ma14="http://schemas.microsoft.com/office/mac/drawingml/2011/main" val="1"/>
             </a:ext>
           </a:extLst>
         </p:spPr>
@@ -3088,56 +3089,191 @@
             <a:pPr lvl="1"/>
             <a:r>
               <a:rPr lang="en-US" dirty="0"/>
-              <a:t>Runs lightweight processes instead of OS threads</a:t>
+              <a:t>Runs lightweight processes </a:t>
+            </a:r>
+            <a:br>
+              <a:rPr lang="en-US" dirty="0"/>
+            </a:br>
+            <a:r>
+              <a:rPr lang="en-US" dirty="0"/>
+              <a:t>instead of OS threads</a:t>
             </a:r>
           </a:p>
           <a:p>
             <a:pPr lvl="1"/>
             <a:r>
               <a:rPr lang="en-US" dirty="0"/>
-              <a:t>No shared state between processes</a:t>
+              <a:t>No shared state </a:t>
+            </a:r>
+            <a:br>
+              <a:rPr lang="en-US" dirty="0"/>
+            </a:br>
+            <a:r>
+              <a:rPr lang="en-US" dirty="0"/>
+              <a:t>between processes</a:t>
             </a:r>
           </a:p>
           <a:p>
             <a:pPr lvl="1"/>
             <a:r>
               <a:rPr lang="en-US" dirty="0"/>
-              <a:t>Communication is done via message passing</a:t>
-            </a:r>
-          </a:p>
-          <a:p>
-            <a:r>
-              <a:rPr lang="en-US" dirty="0"/>
-              <a:t>Isolation means:</a:t>
-            </a:r>
-          </a:p>
-          <a:p>
-            <a:pPr lvl="1"/>
+              <a:t>Communication is done via </a:t>
+            </a:r>
+            <a:br>
+              <a:rPr lang="en-US" dirty="0"/>
+            </a:br>
+            <a:r>
+              <a:rPr lang="en-US" dirty="0"/>
+              <a:t>message passing</a:t>
+            </a:r>
+          </a:p>
+        </p:txBody>
+      </p:sp>
+      <p:pic>
+        <p:nvPicPr>
+          <p:cNvPr id="5" name="Picture 4">
+            <a:extLst>
+              <a:ext uri="{FF2B5EF4-FFF2-40B4-BE49-F238E27FC236}">
+                <a16:creationId xmlns:a16="http://schemas.microsoft.com/office/drawing/2014/main" id="{918F6765-B42E-4337-B35B-3AB41325608A}"/>
+              </a:ext>
+            </a:extLst>
+          </p:cNvPr>
+          <p:cNvPicPr>
+            <a:picLocks noChangeAspect="1"/>
+          </p:cNvPicPr>
+          <p:nvPr/>
+        </p:nvPicPr>
+        <p:blipFill>
+          <a:blip r:embed="rId2"/>
+          <a:stretch>
+            <a:fillRect/>
+          </a:stretch>
+        </p:blipFill>
+        <p:spPr>
+          <a:xfrm>
+            <a:off x="5776165" y="1282951"/>
+            <a:ext cx="5577635" cy="3162289"/>
+          </a:xfrm>
+          <a:prstGeom prst="rect">
+            <a:avLst/>
+          </a:prstGeom>
+        </p:spPr>
+      </p:pic>
+    </p:spTree>
+    <p:extLst>
+      <p:ext uri="{BB962C8B-B14F-4D97-AF65-F5344CB8AC3E}">
+        <p14:creationId xmlns:p14="http://schemas.microsoft.com/office/powerpoint/2010/main" val="3034593965"/>
+      </p:ext>
+    </p:extLst>
+  </p:cSld>
+  <p:clrMapOvr>
+    <a:masterClrMapping/>
+  </p:clrMapOvr>
+  <p:transition spd="med"/>
+</p:sld>
+</file>
+
+<file path=ppt/slides/slide15.xml><?xml version="1.0" encoding="utf-8"?>
+<p:sld xmlns:a="http://schemas.openxmlformats.org/drawingml/2006/main" xmlns:r="http://schemas.openxmlformats.org/officeDocument/2006/relationships" xmlns:p="http://schemas.openxmlformats.org/presentationml/2006/main">
+  <p:cSld>
+    <p:spTree>
+      <p:nvGrpSpPr>
+        <p:cNvPr id="1" name=""/>
+        <p:cNvGrpSpPr/>
+        <p:nvPr/>
+      </p:nvGrpSpPr>
+      <p:grpSpPr>
+        <a:xfrm>
+          <a:off x="0" y="0"/>
+          <a:ext cx="0" cy="0"/>
+          <a:chOff x="0" y="0"/>
+          <a:chExt cx="0" cy="0"/>
+        </a:xfrm>
+      </p:grpSpPr>
+      <p:sp>
+        <p:nvSpPr>
+          <p:cNvPr id="2" name="Title 1">
+            <a:extLst>
+              <a:ext uri="{FF2B5EF4-FFF2-40B4-BE49-F238E27FC236}">
+                <a16:creationId xmlns:a16="http://schemas.microsoft.com/office/drawing/2014/main" id="{A1C14558-4D95-45AE-9C9E-71ADB1088A8F}"/>
+              </a:ext>
+            </a:extLst>
+          </p:cNvPr>
+          <p:cNvSpPr>
+            <a:spLocks noGrp="1"/>
+          </p:cNvSpPr>
+          <p:nvPr>
+            <p:ph type="title"/>
+          </p:nvPr>
+        </p:nvSpPr>
+        <p:spPr/>
+        <p:txBody>
+          <a:bodyPr/>
+          <a:lstStyle/>
+          <a:p>
+            <a:r>
+              <a:rPr lang="en-US" dirty="0"/>
+              <a:t>Concurrency model benefits</a:t>
+            </a:r>
+          </a:p>
+        </p:txBody>
+      </p:sp>
+      <p:sp>
+        <p:nvSpPr>
+          <p:cNvPr id="3" name="Text Placeholder 2">
+            <a:extLst>
+              <a:ext uri="{FF2B5EF4-FFF2-40B4-BE49-F238E27FC236}">
+                <a16:creationId xmlns:a16="http://schemas.microsoft.com/office/drawing/2014/main" id="{D3EB9FDE-B070-469E-BCB0-2A1E623C0AD3}"/>
+              </a:ext>
+            </a:extLst>
+          </p:cNvPr>
+          <p:cNvSpPr>
+            <a:spLocks noGrp="1"/>
+          </p:cNvSpPr>
+          <p:nvPr>
+            <p:ph type="body" idx="1"/>
+          </p:nvPr>
+        </p:nvSpPr>
+        <p:spPr/>
+        <p:txBody>
+          <a:bodyPr/>
+          <a:lstStyle/>
+          <a:p>
             <a:r>
               <a:rPr lang="en-US" dirty="0"/>
               <a:t>Better performance (no locks)</a:t>
             </a:r>
           </a:p>
           <a:p>
-            <a:pPr lvl="1"/>
+            <a:endParaRPr lang="en-US" dirty="0"/>
+          </a:p>
+          <a:p>
             <a:r>
               <a:rPr lang="en-US" dirty="0"/>
               <a:t>Fault tolerance</a:t>
             </a:r>
           </a:p>
           <a:p>
-            <a:pPr lvl="1"/>
+            <a:endParaRPr lang="en-US" dirty="0"/>
+          </a:p>
+          <a:p>
             <a:r>
               <a:rPr lang="en-US" dirty="0"/>
               <a:t>Scalability – up to ~268M running processes</a:t>
             </a:r>
+          </a:p>
+          <a:p>
+            <a:endParaRPr lang="en-US" dirty="0"/>
+          </a:p>
+          <a:p>
+            <a:endParaRPr lang="en-US" dirty="0"/>
           </a:p>
         </p:txBody>
       </p:sp>
     </p:spTree>
     <p:extLst>
       <p:ext uri="{BB962C8B-B14F-4D97-AF65-F5344CB8AC3E}">
-        <p14:creationId xmlns:p14="http://schemas.microsoft.com/office/powerpoint/2010/main" val="3034593965"/>
+        <p14:creationId xmlns:p14="http://schemas.microsoft.com/office/powerpoint/2010/main" val="3973993594"/>
       </p:ext>
     </p:extLst>
   </p:cSld>
@@ -6471,12 +6607,6 @@
 </file>
 
 <file path=customXml/item1.xml><?xml version="1.0" encoding="utf-8"?>
-<p:properties xmlns:p="http://schemas.microsoft.com/office/2006/metadata/properties" xmlns:xsi="http://www.w3.org/2001/XMLSchema-instance" xmlns:pc="http://schemas.microsoft.com/office/infopath/2007/PartnerControls">
-  <documentManagement/>
-</p:properties>
-</file>
-
-<file path=customXml/item2.xml><?xml version="1.0" encoding="utf-8"?>
 <ct:contentTypeSchema xmlns:ct="http://schemas.microsoft.com/office/2006/metadata/contentType" xmlns:ma="http://schemas.microsoft.com/office/2006/metadata/properties/metaAttributes" ct:_="" ma:_="" ma:contentTypeName="Document" ma:contentTypeID="0x0101004FE2915043E30E43AE6BD266BA7C260E" ma:contentTypeVersion="10" ma:contentTypeDescription="Create a new document." ma:contentTypeScope="" ma:versionID="2be7ab3cc8b59e7568c8f4ab777f1af6">
   <xsd:schema xmlns:xsd="http://www.w3.org/2001/XMLSchema" xmlns:xs="http://www.w3.org/2001/XMLSchema" xmlns:p="http://schemas.microsoft.com/office/2006/metadata/properties" xmlns:ns2="e4ee0c53-2d94-43da-a56a-ee2266385724" xmlns:ns3="649eb69c-f108-4a9e-8f42-09f1f02c87f5" targetNamespace="http://schemas.microsoft.com/office/2006/metadata/properties" ma:root="true" ma:fieldsID="65b55a7f7c772a96aad2501ed6708a0d" ns2:_="" ns3:_="">
     <xsd:import namespace="e4ee0c53-2d94-43da-a56a-ee2266385724"/>
@@ -6679,6 +6809,12 @@
 </ct:contentTypeSchema>
 </file>
 
+<file path=customXml/item2.xml><?xml version="1.0" encoding="utf-8"?>
+<p:properties xmlns:p="http://schemas.microsoft.com/office/2006/metadata/properties" xmlns:xsi="http://www.w3.org/2001/XMLSchema-instance" xmlns:pc="http://schemas.microsoft.com/office/infopath/2007/PartnerControls">
+  <documentManagement/>
+</p:properties>
+</file>
+
 <file path=customXml/item3.xml><?xml version="1.0" encoding="utf-8"?>
 <?mso-contentType ?>
 <FormTemplates xmlns="http://schemas.microsoft.com/sharepoint/v3/contenttype/forms">
@@ -6689,15 +6825,6 @@
 </file>
 
 <file path=customXml/itemProps1.xml><?xml version="1.0" encoding="utf-8"?>
-<ds:datastoreItem xmlns:ds="http://schemas.openxmlformats.org/officeDocument/2006/customXml" ds:itemID="{28013F97-F744-428B-8504-911AB7D87FBC}">
-  <ds:schemaRefs>
-    <ds:schemaRef ds:uri="http://schemas.microsoft.com/office/2006/metadata/properties"/>
-    <ds:schemaRef ds:uri="http://schemas.microsoft.com/office/infopath/2007/PartnerControls"/>
-  </ds:schemaRefs>
-</ds:datastoreItem>
-</file>
-
-<file path=customXml/itemProps2.xml><?xml version="1.0" encoding="utf-8"?>
 <ds:datastoreItem xmlns:ds="http://schemas.openxmlformats.org/officeDocument/2006/customXml" ds:itemID="{7BCD7B8E-9E4C-43E9-8D0A-A2FE873E7128}">
   <ds:schemaRefs>
     <ds:schemaRef ds:uri="http://schemas.microsoft.com/office/2006/metadata/contentType"/>
@@ -6716,6 +6843,15 @@
 </ds:datastoreItem>
 </file>
 
+<file path=customXml/itemProps2.xml><?xml version="1.0" encoding="utf-8"?>
+<ds:datastoreItem xmlns:ds="http://schemas.openxmlformats.org/officeDocument/2006/customXml" ds:itemID="{28013F97-F744-428B-8504-911AB7D87FBC}">
+  <ds:schemaRefs>
+    <ds:schemaRef ds:uri="http://schemas.microsoft.com/office/2006/metadata/properties"/>
+    <ds:schemaRef ds:uri="http://schemas.microsoft.com/office/infopath/2007/PartnerControls"/>
+  </ds:schemaRefs>
+</ds:datastoreItem>
+</file>
+
 <file path=customXml/itemProps3.xml><?xml version="1.0" encoding="utf-8"?>
 <ds:datastoreItem xmlns:ds="http://schemas.openxmlformats.org/officeDocument/2006/customXml" ds:itemID="{450D9D61-AB1C-42DB-97B3-F16948BBEDA5}">
   <ds:schemaRefs>

</xml_diff>

<commit_message>
Added some performance examples to presentation
</commit_message>
<xml_diff>
--- a/Elixir Tech Talk.pptx
+++ b/Elixir Tech Talk.pptx
@@ -5,7 +5,7 @@
     <p:sldMasterId id="2147483648" r:id="rId4"/>
   </p:sldMasterIdLst>
   <p:notesMasterIdLst>
-    <p:notesMasterId r:id="rId22"/>
+    <p:notesMasterId r:id="rId23"/>
   </p:notesMasterIdLst>
   <p:sldIdLst>
     <p:sldId id="258" r:id="rId5"/>
@@ -23,8 +23,9 @@
     <p:sldId id="282" r:id="rId17"/>
     <p:sldId id="283" r:id="rId18"/>
     <p:sldId id="284" r:id="rId19"/>
-    <p:sldId id="285" r:id="rId20"/>
-    <p:sldId id="287" r:id="rId21"/>
+    <p:sldId id="288" r:id="rId20"/>
+    <p:sldId id="285" r:id="rId21"/>
+    <p:sldId id="287" r:id="rId22"/>
   </p:sldIdLst>
   <p:sldSz cx="12192000" cy="6858000"/>
   <p:notesSz cx="6858000" cy="9144000"/>
@@ -815,7 +816,7 @@
           </a:ln>
           <a:extLst>
             <a:ext uri="{C572A759-6A51-4108-AA02-DFA0A04FC94B}">
-              <ma14:wrappingTextBoxFlag xmlns:ma14="http://schemas.microsoft.com/office/mac/drawingml/2011/main" xmlns:a14="http://schemas.microsoft.com/office/drawing/2010/main" xmlns:m="http://schemas.openxmlformats.org/officeDocument/2006/math" xmlns="" val="1"/>
+              <ma14:wrappingTextBoxFlag xmlns="" xmlns:m="http://schemas.openxmlformats.org/officeDocument/2006/math" xmlns:a14="http://schemas.microsoft.com/office/drawing/2010/main" xmlns:ma14="http://schemas.microsoft.com/office/mac/drawingml/2011/main" val="1"/>
             </a:ext>
           </a:extLst>
         </p:spPr>
@@ -1083,7 +1084,7 @@
           </a:ln>
           <a:extLst>
             <a:ext uri="{C572A759-6A51-4108-AA02-DFA0A04FC94B}">
-              <ma14:wrappingTextBoxFlag xmlns:ma14="http://schemas.microsoft.com/office/mac/drawingml/2011/main" xmlns:a14="http://schemas.microsoft.com/office/drawing/2010/main" xmlns:m="http://schemas.openxmlformats.org/officeDocument/2006/math" xmlns="" val="1"/>
+              <ma14:wrappingTextBoxFlag xmlns="" xmlns:m="http://schemas.openxmlformats.org/officeDocument/2006/math" xmlns:a14="http://schemas.microsoft.com/office/drawing/2010/main" xmlns:ma14="http://schemas.microsoft.com/office/mac/drawingml/2011/main" val="1"/>
             </a:ext>
           </a:extLst>
         </p:spPr>
@@ -1342,7 +1343,7 @@
           </a:ln>
           <a:extLst>
             <a:ext uri="{C572A759-6A51-4108-AA02-DFA0A04FC94B}">
-              <ma14:wrappingTextBoxFlag xmlns:ma14="http://schemas.microsoft.com/office/mac/drawingml/2011/main" xmlns:a14="http://schemas.microsoft.com/office/drawing/2010/main" xmlns:m="http://schemas.openxmlformats.org/officeDocument/2006/math" xmlns="" val="1"/>
+              <ma14:wrappingTextBoxFlag xmlns="" xmlns:m="http://schemas.openxmlformats.org/officeDocument/2006/math" xmlns:a14="http://schemas.microsoft.com/office/drawing/2010/main" xmlns:ma14="http://schemas.microsoft.com/office/mac/drawingml/2011/main" val="1"/>
             </a:ext>
           </a:extLst>
         </p:spPr>
@@ -1381,7 +1382,7 @@
           </a:ln>
           <a:extLst>
             <a:ext uri="{C572A759-6A51-4108-AA02-DFA0A04FC94B}">
-              <ma14:wrappingTextBoxFlag xmlns:ma14="http://schemas.microsoft.com/office/mac/drawingml/2011/main" xmlns:a14="http://schemas.microsoft.com/office/drawing/2010/main" xmlns:m="http://schemas.openxmlformats.org/officeDocument/2006/math" xmlns="" val="1"/>
+              <ma14:wrappingTextBoxFlag xmlns="" xmlns:m="http://schemas.openxmlformats.org/officeDocument/2006/math" xmlns:a14="http://schemas.microsoft.com/office/drawing/2010/main" xmlns:ma14="http://schemas.microsoft.com/office/mac/drawingml/2011/main" val="1"/>
             </a:ext>
           </a:extLst>
         </p:spPr>
@@ -1473,7 +1474,7 @@
           </a:ln>
           <a:extLst>
             <a:ext uri="{C572A759-6A51-4108-AA02-DFA0A04FC94B}">
-              <ma14:wrappingTextBoxFlag xmlns:ma14="http://schemas.microsoft.com/office/mac/drawingml/2011/main" xmlns:a14="http://schemas.microsoft.com/office/drawing/2010/main" xmlns:m="http://schemas.openxmlformats.org/officeDocument/2006/math" xmlns="" val="1"/>
+              <ma14:wrappingTextBoxFlag xmlns="" xmlns:m="http://schemas.openxmlformats.org/officeDocument/2006/math" xmlns:a14="http://schemas.microsoft.com/office/drawing/2010/main" xmlns:ma14="http://schemas.microsoft.com/office/mac/drawingml/2011/main" val="1"/>
             </a:ext>
           </a:extLst>
         </p:spPr>
@@ -3302,6 +3303,154 @@
           <p:cNvPr id="2" name="Title 1">
             <a:extLst>
               <a:ext uri="{FF2B5EF4-FFF2-40B4-BE49-F238E27FC236}">
+                <a16:creationId xmlns:a16="http://schemas.microsoft.com/office/drawing/2014/main" id="{A1C14558-4D95-45AE-9C9E-71ADB1088A8F}"/>
+              </a:ext>
+            </a:extLst>
+          </p:cNvPr>
+          <p:cNvSpPr>
+            <a:spLocks noGrp="1"/>
+          </p:cNvSpPr>
+          <p:nvPr>
+            <p:ph type="title"/>
+          </p:nvPr>
+        </p:nvSpPr>
+        <p:spPr/>
+        <p:txBody>
+          <a:bodyPr/>
+          <a:lstStyle/>
+          <a:p>
+            <a:r>
+              <a:rPr lang="en-US" dirty="0"/>
+              <a:t>Performance examples</a:t>
+            </a:r>
+          </a:p>
+        </p:txBody>
+      </p:sp>
+      <p:sp>
+        <p:nvSpPr>
+          <p:cNvPr id="3" name="Text Placeholder 2">
+            <a:extLst>
+              <a:ext uri="{FF2B5EF4-FFF2-40B4-BE49-F238E27FC236}">
+                <a16:creationId xmlns:a16="http://schemas.microsoft.com/office/drawing/2014/main" id="{D3EB9FDE-B070-469E-BCB0-2A1E623C0AD3}"/>
+              </a:ext>
+            </a:extLst>
+          </p:cNvPr>
+          <p:cNvSpPr>
+            <a:spLocks noGrp="1"/>
+          </p:cNvSpPr>
+          <p:nvPr>
+            <p:ph type="body" idx="1"/>
+          </p:nvPr>
+        </p:nvSpPr>
+        <p:spPr/>
+        <p:txBody>
+          <a:bodyPr/>
+          <a:lstStyle/>
+          <a:p>
+            <a:r>
+              <a:rPr lang="en-US" dirty="0">
+                <a:hlinkClick r:id="rId2"/>
+              </a:rPr>
+              <a:t>The Road to 2M WebSocket Connections</a:t>
+            </a:r>
+            <a:endParaRPr lang="en-US" dirty="0"/>
+          </a:p>
+          <a:p>
+            <a:endParaRPr lang="en-US" dirty="0"/>
+          </a:p>
+          <a:p>
+            <a:r>
+              <a:rPr lang="en-US" dirty="0">
+                <a:hlinkClick r:id="rId3"/>
+              </a:rPr>
+              <a:t>How Discord Scaled Elixir to 5,000,000 Concurrent Users</a:t>
+            </a:r>
+            <a:endParaRPr lang="bg-BG" dirty="0"/>
+          </a:p>
+          <a:p>
+            <a:endParaRPr lang="en-US" dirty="0"/>
+          </a:p>
+          <a:p>
+            <a:r>
+              <a:rPr lang="en-US" dirty="0">
+                <a:hlinkClick r:id="rId4"/>
+              </a:rPr>
+              <a:t>Processing 2.7 million images with Elixir</a:t>
+            </a:r>
+            <a:endParaRPr lang="en-US" dirty="0"/>
+          </a:p>
+          <a:p>
+            <a:endParaRPr lang="en-US" dirty="0"/>
+          </a:p>
+          <a:p>
+            <a:r>
+              <a:rPr lang="en-US" dirty="0"/>
+              <a:t>Presentation: </a:t>
+            </a:r>
+            <a:r>
+              <a:rPr lang="en-US" dirty="0">
+                <a:hlinkClick r:id="rId5"/>
+              </a:rPr>
+              <a:t>github.com/</a:t>
+            </a:r>
+            <a:r>
+              <a:rPr lang="en-US" dirty="0" err="1">
+                <a:hlinkClick r:id="rId5"/>
+              </a:rPr>
+              <a:t>georgiyolovski</a:t>
+            </a:r>
+            <a:r>
+              <a:rPr lang="en-US" dirty="0">
+                <a:hlinkClick r:id="rId5"/>
+              </a:rPr>
+              <a:t>/elixir-tech-talk</a:t>
+            </a:r>
+            <a:endParaRPr lang="en-US" dirty="0"/>
+          </a:p>
+          <a:p>
+            <a:endParaRPr lang="en-US" dirty="0"/>
+          </a:p>
+          <a:p>
+            <a:endParaRPr lang="en-US" dirty="0"/>
+          </a:p>
+        </p:txBody>
+      </p:sp>
+    </p:spTree>
+    <p:extLst>
+      <p:ext uri="{BB962C8B-B14F-4D97-AF65-F5344CB8AC3E}">
+        <p14:creationId xmlns:p14="http://schemas.microsoft.com/office/powerpoint/2010/main" val="3832160139"/>
+      </p:ext>
+    </p:extLst>
+  </p:cSld>
+  <p:clrMapOvr>
+    <a:masterClrMapping/>
+  </p:clrMapOvr>
+  <p:transition spd="med"/>
+</p:sld>
+</file>
+
+<file path=ppt/slides/slide17.xml><?xml version="1.0" encoding="utf-8"?>
+<p:sld xmlns:a="http://schemas.openxmlformats.org/drawingml/2006/main" xmlns:r="http://schemas.openxmlformats.org/officeDocument/2006/relationships" xmlns:p="http://schemas.openxmlformats.org/presentationml/2006/main">
+  <p:cSld>
+    <p:spTree>
+      <p:nvGrpSpPr>
+        <p:cNvPr id="1" name=""/>
+        <p:cNvGrpSpPr/>
+        <p:nvPr/>
+      </p:nvGrpSpPr>
+      <p:grpSpPr>
+        <a:xfrm>
+          <a:off x="0" y="0"/>
+          <a:ext cx="0" cy="0"/>
+          <a:chOff x="0" y="0"/>
+          <a:chExt cx="0" cy="0"/>
+        </a:xfrm>
+      </p:grpSpPr>
+      <p:sp>
+        <p:nvSpPr>
+          <p:cNvPr id="2" name="Title 1">
+            <a:extLst>
+              <a:ext uri="{FF2B5EF4-FFF2-40B4-BE49-F238E27FC236}">
                 <a16:creationId xmlns:a16="http://schemas.microsoft.com/office/drawing/2014/main" id="{FE3A8060-0365-4BE3-8B57-42830190ADE4}"/>
               </a:ext>
             </a:extLst>
@@ -3394,7 +3543,7 @@
 </p:sld>
 </file>
 
-<file path=ppt/slides/slide17.xml><?xml version="1.0" encoding="utf-8"?>
+<file path=ppt/slides/slide18.xml><?xml version="1.0" encoding="utf-8"?>
 <p:sld xmlns:a="http://schemas.openxmlformats.org/drawingml/2006/main" xmlns:r="http://schemas.openxmlformats.org/officeDocument/2006/relationships" xmlns:p="http://schemas.openxmlformats.org/presentationml/2006/main">
   <p:cSld>
     <p:spTree>
@@ -3682,6 +3831,15 @@
           <a:p>
             <a:r>
               <a:rPr lang="en-US" dirty="0"/>
+              <a:t>Runs on BEAM virtual machine</a:t>
+            </a:r>
+          </a:p>
+          <a:p>
+            <a:endParaRPr lang="en-US" dirty="0"/>
+          </a:p>
+          <a:p>
+            <a:r>
+              <a:rPr lang="en-US" dirty="0"/>
               <a:t>Suitable for telecoms</a:t>
             </a:r>
           </a:p>
@@ -3703,7 +3861,7 @@
             <a:pPr lvl="1"/>
             <a:r>
               <a:rPr lang="en-US" dirty="0"/>
-              <a:t>Highly-available</a:t>
+              <a:t>High-availability</a:t>
             </a:r>
           </a:p>
           <a:p>
@@ -3714,15 +3872,6 @@
             <a:r>
               <a:rPr lang="en-US" dirty="0"/>
               <a:t>Used by WhatsApp, RabbitMQ, Motorola</a:t>
-            </a:r>
-          </a:p>
-          <a:p>
-            <a:endParaRPr lang="en-US" dirty="0"/>
-          </a:p>
-          <a:p>
-            <a:r>
-              <a:rPr lang="en-US" dirty="0"/>
-              <a:t>Runs on BEAM virtual machine</a:t>
             </a:r>
           </a:p>
         </p:txBody>
@@ -6801,12 +6950,6 @@
 </file>
 
 <file path=customXml/item1.xml><?xml version="1.0" encoding="utf-8"?>
-<p:properties xmlns:p="http://schemas.microsoft.com/office/2006/metadata/properties" xmlns:xsi="http://www.w3.org/2001/XMLSchema-instance" xmlns:pc="http://schemas.microsoft.com/office/infopath/2007/PartnerControls">
-  <documentManagement/>
-</p:properties>
-</file>
-
-<file path=customXml/item2.xml><?xml version="1.0" encoding="utf-8"?>
 <ct:contentTypeSchema xmlns:ct="http://schemas.microsoft.com/office/2006/metadata/contentType" xmlns:ma="http://schemas.microsoft.com/office/2006/metadata/properties/metaAttributes" ct:_="" ma:_="" ma:contentTypeName="Document" ma:contentTypeID="0x0101004FE2915043E30E43AE6BD266BA7C260E" ma:contentTypeVersion="10" ma:contentTypeDescription="Create a new document." ma:contentTypeScope="" ma:versionID="2be7ab3cc8b59e7568c8f4ab777f1af6">
   <xsd:schema xmlns:xsd="http://www.w3.org/2001/XMLSchema" xmlns:xs="http://www.w3.org/2001/XMLSchema" xmlns:p="http://schemas.microsoft.com/office/2006/metadata/properties" xmlns:ns2="e4ee0c53-2d94-43da-a56a-ee2266385724" xmlns:ns3="649eb69c-f108-4a9e-8f42-09f1f02c87f5" targetNamespace="http://schemas.microsoft.com/office/2006/metadata/properties" ma:root="true" ma:fieldsID="65b55a7f7c772a96aad2501ed6708a0d" ns2:_="" ns3:_="">
     <xsd:import namespace="e4ee0c53-2d94-43da-a56a-ee2266385724"/>
@@ -7009,6 +7152,12 @@
 </ct:contentTypeSchema>
 </file>
 
+<file path=customXml/item2.xml><?xml version="1.0" encoding="utf-8"?>
+<p:properties xmlns:p="http://schemas.microsoft.com/office/2006/metadata/properties" xmlns:xsi="http://www.w3.org/2001/XMLSchema-instance" xmlns:pc="http://schemas.microsoft.com/office/infopath/2007/PartnerControls">
+  <documentManagement/>
+</p:properties>
+</file>
+
 <file path=customXml/item3.xml><?xml version="1.0" encoding="utf-8"?>
 <?mso-contentType ?>
 <FormTemplates xmlns="http://schemas.microsoft.com/sharepoint/v3/contenttype/forms">
@@ -7019,15 +7168,6 @@
 </file>
 
 <file path=customXml/itemProps1.xml><?xml version="1.0" encoding="utf-8"?>
-<ds:datastoreItem xmlns:ds="http://schemas.openxmlformats.org/officeDocument/2006/customXml" ds:itemID="{28013F97-F744-428B-8504-911AB7D87FBC}">
-  <ds:schemaRefs>
-    <ds:schemaRef ds:uri="http://schemas.microsoft.com/office/2006/metadata/properties"/>
-    <ds:schemaRef ds:uri="http://schemas.microsoft.com/office/infopath/2007/PartnerControls"/>
-  </ds:schemaRefs>
-</ds:datastoreItem>
-</file>
-
-<file path=customXml/itemProps2.xml><?xml version="1.0" encoding="utf-8"?>
 <ds:datastoreItem xmlns:ds="http://schemas.openxmlformats.org/officeDocument/2006/customXml" ds:itemID="{7BCD7B8E-9E4C-43E9-8D0A-A2FE873E7128}">
   <ds:schemaRefs>
     <ds:schemaRef ds:uri="http://schemas.microsoft.com/office/2006/metadata/contentType"/>
@@ -7046,6 +7186,15 @@
 </ds:datastoreItem>
 </file>
 
+<file path=customXml/itemProps2.xml><?xml version="1.0" encoding="utf-8"?>
+<ds:datastoreItem xmlns:ds="http://schemas.openxmlformats.org/officeDocument/2006/customXml" ds:itemID="{28013F97-F744-428B-8504-911AB7D87FBC}">
+  <ds:schemaRefs>
+    <ds:schemaRef ds:uri="http://schemas.microsoft.com/office/2006/metadata/properties"/>
+    <ds:schemaRef ds:uri="http://schemas.microsoft.com/office/infopath/2007/PartnerControls"/>
+  </ds:schemaRefs>
+</ds:datastoreItem>
+</file>
+
 <file path=customXml/itemProps3.xml><?xml version="1.0" encoding="utf-8"?>
 <ds:datastoreItem xmlns:ds="http://schemas.openxmlformats.org/officeDocument/2006/customXml" ds:itemID="{450D9D61-AB1C-42DB-97B3-F16948BBEDA5}">
   <ds:schemaRefs>

</xml_diff>

<commit_message>
Updated Elixir example usages
</commit_message>
<xml_diff>
--- a/Elixir Tech Talk.pptx
+++ b/Elixir Tech Talk.pptx
@@ -816,7 +816,7 @@
           </a:ln>
           <a:extLst>
             <a:ext uri="{C572A759-6A51-4108-AA02-DFA0A04FC94B}">
-              <ma14:wrappingTextBoxFlag xmlns="" xmlns:m="http://schemas.openxmlformats.org/officeDocument/2006/math" xmlns:a14="http://schemas.microsoft.com/office/drawing/2010/main" xmlns:ma14="http://schemas.microsoft.com/office/mac/drawingml/2011/main" val="1"/>
+              <ma14:wrappingTextBoxFlag xmlns:ma14="http://schemas.microsoft.com/office/mac/drawingml/2011/main" xmlns:a14="http://schemas.microsoft.com/office/drawing/2010/main" xmlns:m="http://schemas.openxmlformats.org/officeDocument/2006/math" xmlns="" val="1"/>
             </a:ext>
           </a:extLst>
         </p:spPr>
@@ -1084,7 +1084,7 @@
           </a:ln>
           <a:extLst>
             <a:ext uri="{C572A759-6A51-4108-AA02-DFA0A04FC94B}">
-              <ma14:wrappingTextBoxFlag xmlns="" xmlns:m="http://schemas.openxmlformats.org/officeDocument/2006/math" xmlns:a14="http://schemas.microsoft.com/office/drawing/2010/main" xmlns:ma14="http://schemas.microsoft.com/office/mac/drawingml/2011/main" val="1"/>
+              <ma14:wrappingTextBoxFlag xmlns:ma14="http://schemas.microsoft.com/office/mac/drawingml/2011/main" xmlns:a14="http://schemas.microsoft.com/office/drawing/2010/main" xmlns:m="http://schemas.openxmlformats.org/officeDocument/2006/math" xmlns="" val="1"/>
             </a:ext>
           </a:extLst>
         </p:spPr>
@@ -1343,7 +1343,7 @@
           </a:ln>
           <a:extLst>
             <a:ext uri="{C572A759-6A51-4108-AA02-DFA0A04FC94B}">
-              <ma14:wrappingTextBoxFlag xmlns="" xmlns:m="http://schemas.openxmlformats.org/officeDocument/2006/math" xmlns:a14="http://schemas.microsoft.com/office/drawing/2010/main" xmlns:ma14="http://schemas.microsoft.com/office/mac/drawingml/2011/main" val="1"/>
+              <ma14:wrappingTextBoxFlag xmlns:ma14="http://schemas.microsoft.com/office/mac/drawingml/2011/main" xmlns:a14="http://schemas.microsoft.com/office/drawing/2010/main" xmlns:m="http://schemas.openxmlformats.org/officeDocument/2006/math" xmlns="" val="1"/>
             </a:ext>
           </a:extLst>
         </p:spPr>
@@ -1382,7 +1382,7 @@
           </a:ln>
           <a:extLst>
             <a:ext uri="{C572A759-6A51-4108-AA02-DFA0A04FC94B}">
-              <ma14:wrappingTextBoxFlag xmlns="" xmlns:m="http://schemas.openxmlformats.org/officeDocument/2006/math" xmlns:a14="http://schemas.microsoft.com/office/drawing/2010/main" xmlns:ma14="http://schemas.microsoft.com/office/mac/drawingml/2011/main" val="1"/>
+              <ma14:wrappingTextBoxFlag xmlns:ma14="http://schemas.microsoft.com/office/mac/drawingml/2011/main" xmlns:a14="http://schemas.microsoft.com/office/drawing/2010/main" xmlns:m="http://schemas.openxmlformats.org/officeDocument/2006/math" xmlns="" val="1"/>
             </a:ext>
           </a:extLst>
         </p:spPr>
@@ -1474,7 +1474,7 @@
           </a:ln>
           <a:extLst>
             <a:ext uri="{C572A759-6A51-4108-AA02-DFA0A04FC94B}">
-              <ma14:wrappingTextBoxFlag xmlns="" xmlns:m="http://schemas.openxmlformats.org/officeDocument/2006/math" xmlns:a14="http://schemas.microsoft.com/office/drawing/2010/main" xmlns:ma14="http://schemas.microsoft.com/office/mac/drawingml/2011/main" val="1"/>
+              <ma14:wrappingTextBoxFlag xmlns:ma14="http://schemas.microsoft.com/office/mac/drawingml/2011/main" xmlns:a14="http://schemas.microsoft.com/office/drawing/2010/main" xmlns:m="http://schemas.openxmlformats.org/officeDocument/2006/math" xmlns="" val="1"/>
             </a:ext>
           </a:extLst>
         </p:spPr>
@@ -4012,7 +4012,7 @@
             <a:pPr lvl="1"/>
             <a:r>
               <a:rPr lang="en-US" dirty="0"/>
-              <a:t>Used by Discord and Pinterest</a:t>
+              <a:t>Used by Discord, Pinterest, Spotify</a:t>
             </a:r>
           </a:p>
           <a:p>
@@ -6950,6 +6950,12 @@
 </file>
 
 <file path=customXml/item1.xml><?xml version="1.0" encoding="utf-8"?>
+<p:properties xmlns:p="http://schemas.microsoft.com/office/2006/metadata/properties" xmlns:xsi="http://www.w3.org/2001/XMLSchema-instance" xmlns:pc="http://schemas.microsoft.com/office/infopath/2007/PartnerControls">
+  <documentManagement/>
+</p:properties>
+</file>
+
+<file path=customXml/item2.xml><?xml version="1.0" encoding="utf-8"?>
 <ct:contentTypeSchema xmlns:ct="http://schemas.microsoft.com/office/2006/metadata/contentType" xmlns:ma="http://schemas.microsoft.com/office/2006/metadata/properties/metaAttributes" ct:_="" ma:_="" ma:contentTypeName="Document" ma:contentTypeID="0x0101004FE2915043E30E43AE6BD266BA7C260E" ma:contentTypeVersion="10" ma:contentTypeDescription="Create a new document." ma:contentTypeScope="" ma:versionID="2be7ab3cc8b59e7568c8f4ab777f1af6">
   <xsd:schema xmlns:xsd="http://www.w3.org/2001/XMLSchema" xmlns:xs="http://www.w3.org/2001/XMLSchema" xmlns:p="http://schemas.microsoft.com/office/2006/metadata/properties" xmlns:ns2="e4ee0c53-2d94-43da-a56a-ee2266385724" xmlns:ns3="649eb69c-f108-4a9e-8f42-09f1f02c87f5" targetNamespace="http://schemas.microsoft.com/office/2006/metadata/properties" ma:root="true" ma:fieldsID="65b55a7f7c772a96aad2501ed6708a0d" ns2:_="" ns3:_="">
     <xsd:import namespace="e4ee0c53-2d94-43da-a56a-ee2266385724"/>
@@ -7152,12 +7158,6 @@
 </ct:contentTypeSchema>
 </file>
 
-<file path=customXml/item2.xml><?xml version="1.0" encoding="utf-8"?>
-<p:properties xmlns:p="http://schemas.microsoft.com/office/2006/metadata/properties" xmlns:xsi="http://www.w3.org/2001/XMLSchema-instance" xmlns:pc="http://schemas.microsoft.com/office/infopath/2007/PartnerControls">
-  <documentManagement/>
-</p:properties>
-</file>
-
 <file path=customXml/item3.xml><?xml version="1.0" encoding="utf-8"?>
 <?mso-contentType ?>
 <FormTemplates xmlns="http://schemas.microsoft.com/sharepoint/v3/contenttype/forms">
@@ -7168,6 +7168,15 @@
 </file>
 
 <file path=customXml/itemProps1.xml><?xml version="1.0" encoding="utf-8"?>
+<ds:datastoreItem xmlns:ds="http://schemas.openxmlformats.org/officeDocument/2006/customXml" ds:itemID="{28013F97-F744-428B-8504-911AB7D87FBC}">
+  <ds:schemaRefs>
+    <ds:schemaRef ds:uri="http://schemas.microsoft.com/office/2006/metadata/properties"/>
+    <ds:schemaRef ds:uri="http://schemas.microsoft.com/office/infopath/2007/PartnerControls"/>
+  </ds:schemaRefs>
+</ds:datastoreItem>
+</file>
+
+<file path=customXml/itemProps2.xml><?xml version="1.0" encoding="utf-8"?>
 <ds:datastoreItem xmlns:ds="http://schemas.openxmlformats.org/officeDocument/2006/customXml" ds:itemID="{7BCD7B8E-9E4C-43E9-8D0A-A2FE873E7128}">
   <ds:schemaRefs>
     <ds:schemaRef ds:uri="http://schemas.microsoft.com/office/2006/metadata/contentType"/>
@@ -7186,15 +7195,6 @@
 </ds:datastoreItem>
 </file>
 
-<file path=customXml/itemProps2.xml><?xml version="1.0" encoding="utf-8"?>
-<ds:datastoreItem xmlns:ds="http://schemas.openxmlformats.org/officeDocument/2006/customXml" ds:itemID="{28013F97-F744-428B-8504-911AB7D87FBC}">
-  <ds:schemaRefs>
-    <ds:schemaRef ds:uri="http://schemas.microsoft.com/office/2006/metadata/properties"/>
-    <ds:schemaRef ds:uri="http://schemas.microsoft.com/office/infopath/2007/PartnerControls"/>
-  </ds:schemaRefs>
-</ds:datastoreItem>
-</file>
-
 <file path=customXml/itemProps3.xml><?xml version="1.0" encoding="utf-8"?>
 <ds:datastoreItem xmlns:ds="http://schemas.openxmlformats.org/officeDocument/2006/customXml" ds:itemID="{450D9D61-AB1C-42DB-97B3-F16948BBEDA5}">
   <ds:schemaRefs>

</xml_diff>